<commit_message>
Version 20241202 Updated so script will prompt for config file, and will use profiles in ~/.informatica_cdgc/credentials Also optimized for use with pyinstaller for Windows
</commit_message>
<xml_diff>
--- a/Dataset Element Automation.pptx
+++ b/Dataset Element Automation.pptx
@@ -7,19 +7,18 @@
     <p:sldMasterId id="2147483794" r:id="rId5"/>
   </p:sldMasterIdLst>
   <p:notesMasterIdLst>
-    <p:notesMasterId r:id="rId13"/>
+    <p:notesMasterId r:id="rId12"/>
   </p:notesMasterIdLst>
   <p:handoutMasterIdLst>
-    <p:handoutMasterId r:id="rId14"/>
+    <p:handoutMasterId r:id="rId13"/>
   </p:handoutMasterIdLst>
   <p:sldIdLst>
     <p:sldId id="288" r:id="rId6"/>
     <p:sldId id="2134807745" r:id="rId7"/>
     <p:sldId id="2134807791" r:id="rId8"/>
-    <p:sldId id="2134807800" r:id="rId9"/>
-    <p:sldId id="2134807798" r:id="rId10"/>
-    <p:sldId id="2134807799" r:id="rId11"/>
-    <p:sldId id="267" r:id="rId12"/>
+    <p:sldId id="2134807798" r:id="rId9"/>
+    <p:sldId id="2134807799" r:id="rId10"/>
+    <p:sldId id="267" r:id="rId11"/>
   </p:sldIdLst>
   <p:sldSz cx="12188825" cy="6858000"/>
   <p:notesSz cx="7104063" cy="10234613"/>
@@ -126,7 +125,6 @@
             <p14:sldId id="288"/>
             <p14:sldId id="2134807745"/>
             <p14:sldId id="2134807791"/>
-            <p14:sldId id="2134807800"/>
             <p14:sldId id="2134807798"/>
             <p14:sldId id="2134807799"/>
           </p14:sldIdLst>
@@ -323,7 +321,7 @@
           <a:p>
             <a:fld id="{A8AF0ABA-1503-4581-BC5A-AF3D56D7DD45}" type="datetimeFigureOut">
               <a:rPr lang="en-US" smtClean="0"/>
-              <a:t>11/10/2024</a:t>
+              <a:t>12/2/2024</a:t>
             </a:fld>
             <a:endParaRPr lang="en-US"/>
           </a:p>
@@ -488,7 +486,7 @@
           <a:p>
             <a:fld id="{78186FDC-CD1E-4E7E-B1CD-1CBCCD519E8C}" type="datetimeFigureOut">
               <a:rPr lang="en-US" smtClean="0"/>
-              <a:t>11/10/2024</a:t>
+              <a:t>11/25/2024</a:t>
             </a:fld>
             <a:endParaRPr lang="en-US"/>
           </a:p>
@@ -924,7 +922,7 @@
           <a:p>
             <a:fld id="{4B9A8B04-59C6-4476-9B83-8806D24CC38B}" type="slidenum">
               <a:rPr lang="en-US" smtClean="0"/>
-              <a:t>7</a:t>
+              <a:t>6</a:t>
             </a:fld>
             <a:endParaRPr lang="en-US"/>
           </a:p>
@@ -22663,23 +22661,7 @@
                 <a:ea typeface="Roboto" charset="0"/>
                 <a:cs typeface="Roboto" charset="0"/>
               </a:rPr>
-              <a:t>Allow for criteria, like only include if the element has a </a:t>
-            </a:r>
-            <a:r>
-              <a:rPr lang="en-US" sz="2100" dirty="0" err="1">
-                <a:latin typeface="Roboto" charset="0"/>
-                <a:ea typeface="Roboto" charset="0"/>
-                <a:cs typeface="Roboto" charset="0"/>
-              </a:rPr>
-              <a:t>Busines</a:t>
-            </a:r>
-            <a:r>
-              <a:rPr lang="en-US" sz="2100" dirty="0">
-                <a:latin typeface="Roboto" charset="0"/>
-                <a:ea typeface="Roboto" charset="0"/>
-                <a:cs typeface="Roboto" charset="0"/>
-              </a:rPr>
-              <a:t> Name and/or a Business Term</a:t>
+              <a:t>Allow for criteria, like only include if the element has a Business Name and/or a Business Term</a:t>
             </a:r>
           </a:p>
           <a:p>
@@ -23916,6 +23898,355 @@
       </p:grpSpPr>
       <p:sp>
         <p:nvSpPr>
+          <p:cNvPr id="7" name="TextBox 6">
+            <a:extLst>
+              <a:ext uri="{FF2B5EF4-FFF2-40B4-BE49-F238E27FC236}">
+                <a16:creationId xmlns:a16="http://schemas.microsoft.com/office/drawing/2014/main" id="{07F35619-A211-A191-65EF-4272FD89C8D2}"/>
+              </a:ext>
+            </a:extLst>
+          </p:cNvPr>
+          <p:cNvSpPr txBox="1"/>
+          <p:nvPr/>
+        </p:nvSpPr>
+        <p:spPr>
+          <a:xfrm>
+            <a:off x="589079" y="1071486"/>
+            <a:ext cx="11599746" cy="3778305"/>
+          </a:xfrm>
+          <a:prstGeom prst="rect">
+            <a:avLst/>
+          </a:prstGeom>
+          <a:noFill/>
+        </p:spPr>
+        <p:txBody>
+          <a:bodyPr wrap="square" lIns="0" tIns="0" rIns="0" bIns="0" rtlCol="0">
+            <a:noAutofit/>
+          </a:bodyPr>
+          <a:lstStyle/>
+          <a:p>
+            <a:pPr marL="342900" indent="-342900">
+              <a:lnSpc>
+                <a:spcPct val="90000"/>
+              </a:lnSpc>
+              <a:spcAft>
+                <a:spcPts val="1000"/>
+              </a:spcAft>
+              <a:buFont typeface="Arial" panose="020B0604020202020204" pitchFamily="34" charset="0"/>
+              <a:buChar char="•"/>
+            </a:pPr>
+            <a:r>
+              <a:rPr lang="en-US" sz="1400" dirty="0">
+                <a:latin typeface="Roboto" charset="0"/>
+                <a:ea typeface="Roboto" charset="0"/>
+                <a:cs typeface="Roboto" charset="0"/>
+              </a:rPr>
+              <a:t>By default, the script will prompt to choose a csv file in the same folder as the executable, you optionally, you can also pass the name of your csv file as a command line parameter. For example:</a:t>
+            </a:r>
+          </a:p>
+          <a:p>
+            <a:pPr marL="342900" indent="-342900">
+              <a:lnSpc>
+                <a:spcPct val="90000"/>
+              </a:lnSpc>
+              <a:spcAft>
+                <a:spcPts val="1000"/>
+              </a:spcAft>
+              <a:buFont typeface="Arial" panose="020B0604020202020204" pitchFamily="34" charset="0"/>
+              <a:buChar char="•"/>
+            </a:pPr>
+            <a:r>
+              <a:rPr lang="en-US" sz="1400" dirty="0">
+                <a:latin typeface="Roboto" charset="0"/>
+                <a:ea typeface="Roboto" charset="0"/>
+                <a:cs typeface="Roboto" charset="0"/>
+              </a:rPr>
+              <a:t>An exe file is also available for running on windows, where python is not installed. Simply execute, or </a:t>
+            </a:r>
+            <a:r>
+              <a:rPr lang="en-US" sz="1400" dirty="0" err="1">
+                <a:latin typeface="Roboto" charset="0"/>
+                <a:ea typeface="Roboto" charset="0"/>
+                <a:cs typeface="Roboto" charset="0"/>
+              </a:rPr>
+              <a:t>doubleclick</a:t>
+            </a:r>
+            <a:r>
+              <a:rPr lang="en-US" sz="1400" dirty="0">
+                <a:latin typeface="Roboto" charset="0"/>
+                <a:ea typeface="Roboto" charset="0"/>
+                <a:cs typeface="Roboto" charset="0"/>
+              </a:rPr>
+              <a:t> in Windows explorer.</a:t>
+            </a:r>
+          </a:p>
+          <a:p>
+            <a:pPr>
+              <a:lnSpc>
+                <a:spcPct val="90000"/>
+              </a:lnSpc>
+              <a:spcAft>
+                <a:spcPts val="1000"/>
+              </a:spcAft>
+            </a:pPr>
+            <a:endParaRPr lang="en-US" sz="1400" dirty="0">
+              <a:latin typeface="Roboto" charset="0"/>
+              <a:ea typeface="Roboto" charset="0"/>
+              <a:cs typeface="Roboto" charset="0"/>
+            </a:endParaRPr>
+          </a:p>
+          <a:p>
+            <a:pPr marL="342900" indent="-342900">
+              <a:lnSpc>
+                <a:spcPct val="90000"/>
+              </a:lnSpc>
+              <a:spcAft>
+                <a:spcPts val="1000"/>
+              </a:spcAft>
+              <a:buFont typeface="Arial" panose="020B0604020202020204" pitchFamily="34" charset="0"/>
+              <a:buChar char="•"/>
+            </a:pPr>
+            <a:r>
+              <a:rPr lang="en-US" sz="1400" dirty="0">
+                <a:latin typeface="Roboto" charset="0"/>
+                <a:ea typeface="Roboto" charset="0"/>
+                <a:cs typeface="Roboto" charset="0"/>
+              </a:rPr>
+              <a:t>Additional flags can be set on the script:</a:t>
+            </a:r>
+          </a:p>
+          <a:p>
+            <a:pPr marL="742950" lvl="1" indent="-285750">
+              <a:lnSpc>
+                <a:spcPct val="90000"/>
+              </a:lnSpc>
+              <a:spcAft>
+                <a:spcPts val="1000"/>
+              </a:spcAft>
+              <a:buFont typeface="Arial" panose="020B0604020202020204" pitchFamily="34" charset="0"/>
+              <a:buChar char="•"/>
+            </a:pPr>
+            <a:r>
+              <a:rPr lang="en-US" sz="1400" i="1" dirty="0" err="1">
+                <a:latin typeface="Roboto" charset="0"/>
+                <a:ea typeface="Roboto" charset="0"/>
+                <a:cs typeface="Roboto" charset="0"/>
+              </a:rPr>
+              <a:t>default_pod</a:t>
+            </a:r>
+            <a:r>
+              <a:rPr lang="en-US" sz="1400" dirty="0">
+                <a:latin typeface="Roboto" charset="0"/>
+                <a:ea typeface="Roboto" charset="0"/>
+                <a:cs typeface="Roboto" charset="0"/>
+              </a:rPr>
+              <a:t>. Set this to the default Informatica POD to use. Example: dm-us</a:t>
+            </a:r>
+          </a:p>
+          <a:p>
+            <a:pPr marL="742950" lvl="1" indent="-285750">
+              <a:lnSpc>
+                <a:spcPct val="90000"/>
+              </a:lnSpc>
+              <a:spcAft>
+                <a:spcPts val="1000"/>
+              </a:spcAft>
+              <a:buFont typeface="Arial" panose="020B0604020202020204" pitchFamily="34" charset="0"/>
+              <a:buChar char="•"/>
+            </a:pPr>
+            <a:r>
+              <a:rPr lang="en-US" sz="1400" i="1" dirty="0" err="1">
+                <a:latin typeface="Roboto" charset="0"/>
+                <a:ea typeface="Roboto" charset="0"/>
+                <a:cs typeface="Roboto" charset="0"/>
+              </a:rPr>
+              <a:t>default_user</a:t>
+            </a:r>
+            <a:r>
+              <a:rPr lang="en-US" sz="1400" dirty="0">
+                <a:latin typeface="Roboto" charset="0"/>
+                <a:ea typeface="Roboto" charset="0"/>
+                <a:cs typeface="Roboto" charset="0"/>
+              </a:rPr>
+              <a:t>. Set this to the default user to use. Example: </a:t>
+            </a:r>
+            <a:r>
+              <a:rPr lang="en-US" sz="1400" dirty="0" err="1">
+                <a:latin typeface="Roboto" charset="0"/>
+                <a:ea typeface="Roboto" charset="0"/>
+                <a:cs typeface="Roboto" charset="0"/>
+              </a:rPr>
+              <a:t>shayes_compass</a:t>
+            </a:r>
+            <a:endParaRPr lang="en-US" sz="1400" dirty="0">
+              <a:latin typeface="Roboto" charset="0"/>
+              <a:ea typeface="Roboto" charset="0"/>
+              <a:cs typeface="Roboto" charset="0"/>
+            </a:endParaRPr>
+          </a:p>
+          <a:p>
+            <a:pPr marL="742950" lvl="1" indent="-285750">
+              <a:lnSpc>
+                <a:spcPct val="90000"/>
+              </a:lnSpc>
+              <a:spcAft>
+                <a:spcPts val="1000"/>
+              </a:spcAft>
+              <a:buFont typeface="Arial" panose="020B0604020202020204" pitchFamily="34" charset="0"/>
+              <a:buChar char="•"/>
+            </a:pPr>
+            <a:r>
+              <a:rPr lang="en-US" sz="1400" i="1" dirty="0" err="1">
+                <a:latin typeface="Roboto" charset="0"/>
+                <a:ea typeface="Roboto" charset="0"/>
+                <a:cs typeface="Roboto" charset="0"/>
+              </a:rPr>
+              <a:t>default_pwd</a:t>
+            </a:r>
+            <a:r>
+              <a:rPr lang="en-US" sz="1400" i="1" dirty="0">
+                <a:latin typeface="Roboto" charset="0"/>
+                <a:ea typeface="Roboto" charset="0"/>
+                <a:cs typeface="Roboto" charset="0"/>
+              </a:rPr>
+              <a:t>. </a:t>
+            </a:r>
+            <a:r>
+              <a:rPr lang="en-US" sz="1400" dirty="0">
+                <a:latin typeface="Roboto" charset="0"/>
+                <a:ea typeface="Roboto" charset="0"/>
+                <a:cs typeface="Roboto" charset="0"/>
+              </a:rPr>
+              <a:t>Set this to the default password to use. Example: 1234</a:t>
+            </a:r>
+          </a:p>
+          <a:p>
+            <a:pPr marL="742950" lvl="1" indent="-285750">
+              <a:lnSpc>
+                <a:spcPct val="90000"/>
+              </a:lnSpc>
+              <a:spcAft>
+                <a:spcPts val="1000"/>
+              </a:spcAft>
+              <a:buFont typeface="Arial" panose="020B0604020202020204" pitchFamily="34" charset="0"/>
+              <a:buChar char="•"/>
+            </a:pPr>
+            <a:endParaRPr lang="en-US" sz="1400" dirty="0">
+              <a:latin typeface="Roboto" charset="0"/>
+              <a:ea typeface="Roboto" charset="0"/>
+              <a:cs typeface="Roboto" charset="0"/>
+            </a:endParaRPr>
+          </a:p>
+          <a:p>
+            <a:pPr marL="742950" lvl="1" indent="-285750">
+              <a:lnSpc>
+                <a:spcPct val="90000"/>
+              </a:lnSpc>
+              <a:spcAft>
+                <a:spcPts val="1000"/>
+              </a:spcAft>
+              <a:buFont typeface="Arial" panose="020B0604020202020204" pitchFamily="34" charset="0"/>
+              <a:buChar char="•"/>
+            </a:pPr>
+            <a:r>
+              <a:rPr lang="en-US" sz="1400" i="1" dirty="0" err="1">
+                <a:latin typeface="Roboto" charset="0"/>
+                <a:ea typeface="Roboto" charset="0"/>
+                <a:cs typeface="Roboto" charset="0"/>
+              </a:rPr>
+              <a:t>prompt_for_login_info</a:t>
+            </a:r>
+            <a:r>
+              <a:rPr lang="en-US" sz="1400" dirty="0">
+                <a:latin typeface="Roboto" charset="0"/>
+                <a:ea typeface="Roboto" charset="0"/>
+                <a:cs typeface="Roboto" charset="0"/>
+              </a:rPr>
+              <a:t>. True/False. Whether or not to prompt. If False, will not prompt, unless default is not set</a:t>
+            </a:r>
+          </a:p>
+          <a:p>
+            <a:pPr marL="742950" lvl="1" indent="-285750">
+              <a:lnSpc>
+                <a:spcPct val="90000"/>
+              </a:lnSpc>
+              <a:spcAft>
+                <a:spcPts val="1000"/>
+              </a:spcAft>
+              <a:buFont typeface="Arial" panose="020B0604020202020204" pitchFamily="34" charset="0"/>
+              <a:buChar char="•"/>
+            </a:pPr>
+            <a:r>
+              <a:rPr lang="en-US" sz="1400" i="1" dirty="0" err="1">
+                <a:latin typeface="Roboto" charset="0"/>
+                <a:ea typeface="Roboto" charset="0"/>
+                <a:cs typeface="Roboto" charset="0"/>
+              </a:rPr>
+              <a:t>pause_before_loading</a:t>
+            </a:r>
+            <a:r>
+              <a:rPr lang="en-US" sz="1400" i="1" dirty="0">
+                <a:latin typeface="Roboto" charset="0"/>
+                <a:ea typeface="Roboto" charset="0"/>
+                <a:cs typeface="Roboto" charset="0"/>
+              </a:rPr>
+              <a:t>. </a:t>
+            </a:r>
+            <a:r>
+              <a:rPr lang="en-US" sz="1400" dirty="0">
+                <a:latin typeface="Roboto" charset="0"/>
+                <a:ea typeface="Roboto" charset="0"/>
+                <a:cs typeface="Roboto" charset="0"/>
+              </a:rPr>
+              <a:t>True/False. Whether or not to pause after payload files are created, before loading the  classifications.</a:t>
+            </a:r>
+          </a:p>
+          <a:p>
+            <a:pPr marL="742950" lvl="1" indent="-285750">
+              <a:lnSpc>
+                <a:spcPct val="90000"/>
+              </a:lnSpc>
+              <a:spcAft>
+                <a:spcPts val="1000"/>
+              </a:spcAft>
+              <a:buFont typeface="Arial" panose="020B0604020202020204" pitchFamily="34" charset="0"/>
+              <a:buChar char="•"/>
+            </a:pPr>
+            <a:r>
+              <a:rPr lang="en-US" sz="1400" i="1" dirty="0" err="1">
+                <a:latin typeface="Roboto" charset="0"/>
+                <a:ea typeface="Roboto" charset="0"/>
+                <a:cs typeface="Roboto" charset="0"/>
+              </a:rPr>
+              <a:t>show_raw_errors</a:t>
+            </a:r>
+            <a:r>
+              <a:rPr lang="en-US" sz="1400" dirty="0">
+                <a:latin typeface="Roboto" charset="0"/>
+                <a:ea typeface="Roboto" charset="0"/>
+                <a:cs typeface="Roboto" charset="0"/>
+              </a:rPr>
+              <a:t>. True/False. If set to True, it will always show raw errors if they occur. Otherwise, it will attempt to find the message from the error, and display that.</a:t>
+            </a:r>
+          </a:p>
+          <a:p>
+            <a:pPr>
+              <a:lnSpc>
+                <a:spcPct val="90000"/>
+              </a:lnSpc>
+              <a:spcAft>
+                <a:spcPts val="1000"/>
+              </a:spcAft>
+            </a:pPr>
+            <a:endParaRPr lang="en-US" sz="1500" dirty="0">
+              <a:latin typeface="Roboto" charset="0"/>
+              <a:ea typeface="Roboto" charset="0"/>
+              <a:cs typeface="Roboto" charset="0"/>
+            </a:endParaRPr>
+          </a:p>
+        </p:txBody>
+      </p:sp>
+      <p:sp>
+        <p:nvSpPr>
           <p:cNvPr id="5" name="Title 4">
             <a:extLst>
               <a:ext uri="{FF2B5EF4-FFF2-40B4-BE49-F238E27FC236}">
@@ -23937,7 +24268,7 @@
           <a:p>
             <a:r>
               <a:rPr lang="en-US" dirty="0"/>
-              <a:t>Other Options</a:t>
+              <a:t>Additional Information</a:t>
             </a:r>
             <a:endParaRPr lang="en-IN" dirty="0"/>
           </a:p>
@@ -24210,8 +24541,8 @@
         </p:nvSpPr>
         <p:spPr>
           <a:xfrm>
-            <a:off x="731032" y="1280525"/>
-            <a:ext cx="11195177" cy="4657431"/>
+            <a:off x="1044120" y="4595149"/>
+            <a:ext cx="10750483" cy="1159285"/>
           </a:xfrm>
           <a:prstGeom prst="rect">
             <a:avLst/>
@@ -24224,7 +24555,22 @@
           </a:bodyPr>
           <a:lstStyle/>
           <a:p>
-            <a:pPr marL="342900" indent="-342900">
+            <a:pPr lvl="1">
+              <a:lnSpc>
+                <a:spcPct val="90000"/>
+              </a:lnSpc>
+              <a:spcAft>
+                <a:spcPts val="1000"/>
+              </a:spcAft>
+            </a:pPr>
+            <a:endParaRPr lang="en-US" sz="1400" dirty="0">
+              <a:latin typeface="Roboto" charset="0"/>
+              <a:ea typeface="Roboto" charset="0"/>
+              <a:cs typeface="Roboto" charset="0"/>
+            </a:endParaRPr>
+          </a:p>
+          <a:p>
+            <a:pPr marL="285750" indent="-285750">
               <a:lnSpc>
                 <a:spcPct val="90000"/>
               </a:lnSpc>
@@ -24235,16 +24581,48 @@
               <a:buChar char="•"/>
             </a:pPr>
             <a:r>
-              <a:rPr lang="en-US" sz="1600" dirty="0">
+              <a:rPr lang="en-US" sz="1400" dirty="0">
                 <a:latin typeface="Roboto" charset="0"/>
                 <a:ea typeface="Roboto" charset="0"/>
                 <a:cs typeface="Roboto" charset="0"/>
               </a:rPr>
-              <a:t>Script can also be made to extract existing Classifications. By default, it’ll only do this when it’s needed (setting up Entity Classifications, for example). You can force the extract with a command line parameter</a:t>
-            </a:r>
-          </a:p>
-          <a:p>
-            <a:pPr marL="800100" lvl="1" indent="-342900">
+              <a:t>Optionally, you can create a credentials file in ~/.</a:t>
+            </a:r>
+            <a:r>
+              <a:rPr lang="en-US" sz="1400" dirty="0" err="1">
+                <a:latin typeface="Roboto" charset="0"/>
+                <a:ea typeface="Roboto" charset="0"/>
+                <a:cs typeface="Roboto" charset="0"/>
+              </a:rPr>
+              <a:t>informatica_cdgc</a:t>
+            </a:r>
+            <a:r>
+              <a:rPr lang="en-US" sz="1400" dirty="0">
+                <a:latin typeface="Roboto" charset="0"/>
+                <a:ea typeface="Roboto" charset="0"/>
+                <a:cs typeface="Roboto" charset="0"/>
+              </a:rPr>
+              <a:t> (c:\Users\&lt;username\.</a:t>
+            </a:r>
+            <a:r>
+              <a:rPr lang="en-US" sz="1400" dirty="0" err="1">
+                <a:latin typeface="Roboto" charset="0"/>
+                <a:ea typeface="Roboto" charset="0"/>
+                <a:cs typeface="Roboto" charset="0"/>
+              </a:rPr>
+              <a:t>informatica_cdgc</a:t>
+            </a:r>
+            <a:r>
+              <a:rPr lang="en-US" sz="1400" dirty="0">
+                <a:latin typeface="Roboto" charset="0"/>
+                <a:ea typeface="Roboto" charset="0"/>
+                <a:cs typeface="Roboto" charset="0"/>
+              </a:rPr>
+              <a:t> for Windows). If it finds a default profile, it'll use it, otherwise it'll prompt for which profile to use. If you credential file exists, you will be prompted. Example credentials file:</a:t>
+            </a:r>
+          </a:p>
+          <a:p>
+            <a:pPr marL="742950" lvl="1" indent="-285750">
               <a:lnSpc>
                 <a:spcPct val="90000"/>
               </a:lnSpc>
@@ -24254,146 +24632,7 @@
               <a:buFont typeface="Arial" panose="020B0604020202020204" pitchFamily="34" charset="0"/>
               <a:buChar char="•"/>
             </a:pPr>
-            <a:endParaRPr lang="en-US" sz="1600" dirty="0">
-              <a:latin typeface="Roboto" charset="0"/>
-              <a:ea typeface="Roboto" charset="0"/>
-              <a:cs typeface="Roboto" charset="0"/>
-            </a:endParaRPr>
-          </a:p>
-          <a:p>
-            <a:pPr marL="800100" lvl="1" indent="-342900">
-              <a:lnSpc>
-                <a:spcPct val="90000"/>
-              </a:lnSpc>
-              <a:spcAft>
-                <a:spcPts val="1000"/>
-              </a:spcAft>
-              <a:buFont typeface="Arial" panose="020B0604020202020204" pitchFamily="34" charset="0"/>
-              <a:buChar char="•"/>
-            </a:pPr>
-            <a:endParaRPr lang="en-US" sz="1600" dirty="0">
-              <a:latin typeface="Roboto" charset="0"/>
-              <a:ea typeface="Roboto" charset="0"/>
-              <a:cs typeface="Roboto" charset="0"/>
-            </a:endParaRPr>
-          </a:p>
-          <a:p>
-            <a:pPr marL="800100" lvl="1" indent="-342900">
-              <a:lnSpc>
-                <a:spcPct val="90000"/>
-              </a:lnSpc>
-              <a:spcAft>
-                <a:spcPts val="1000"/>
-              </a:spcAft>
-              <a:buFont typeface="Arial" panose="020B0604020202020204" pitchFamily="34" charset="0"/>
-              <a:buChar char="•"/>
-            </a:pPr>
-            <a:endParaRPr lang="en-US" sz="1600" dirty="0">
-              <a:latin typeface="Roboto" charset="0"/>
-              <a:ea typeface="Roboto" charset="0"/>
-              <a:cs typeface="Roboto" charset="0"/>
-            </a:endParaRPr>
-          </a:p>
-          <a:p>
-            <a:pPr marL="342900" indent="-342900">
-              <a:lnSpc>
-                <a:spcPct val="90000"/>
-              </a:lnSpc>
-              <a:spcAft>
-                <a:spcPts val="1000"/>
-              </a:spcAft>
-              <a:buFont typeface="Arial" panose="020B0604020202020204" pitchFamily="34" charset="0"/>
-              <a:buChar char="•"/>
-            </a:pPr>
-            <a:r>
-              <a:rPr lang="en-US" sz="1600" dirty="0">
-                <a:latin typeface="Roboto" charset="0"/>
-                <a:ea typeface="Roboto" charset="0"/>
-                <a:cs typeface="Roboto" charset="0"/>
-              </a:rPr>
-              <a:t>Deleting Classifications are done by executing a job. You can execute them in bulk by formatting a simple csv file (classifications_delete.csv by default) with the Classification Name, and Action (set to DELETE). You can run the script with a delete command line parameter, and optionally the csv file that contain the classifications to be deleted.</a:t>
-            </a:r>
-          </a:p>
-          <a:p>
-            <a:pPr marL="342900" indent="-342900">
-              <a:lnSpc>
-                <a:spcPct val="90000"/>
-              </a:lnSpc>
-              <a:spcAft>
-                <a:spcPts val="1000"/>
-              </a:spcAft>
-              <a:buFont typeface="Arial" panose="020B0604020202020204" pitchFamily="34" charset="0"/>
-              <a:buChar char="•"/>
-            </a:pPr>
-            <a:endParaRPr lang="en-US" sz="1600" dirty="0">
-              <a:latin typeface="Roboto" charset="0"/>
-              <a:ea typeface="Roboto" charset="0"/>
-              <a:cs typeface="Roboto" charset="0"/>
-            </a:endParaRPr>
-          </a:p>
-          <a:p>
-            <a:pPr marL="342900" indent="-342900">
-              <a:lnSpc>
-                <a:spcPct val="90000"/>
-              </a:lnSpc>
-              <a:spcAft>
-                <a:spcPts val="1000"/>
-              </a:spcAft>
-              <a:buFont typeface="Arial" panose="020B0604020202020204" pitchFamily="34" charset="0"/>
-              <a:buChar char="•"/>
-            </a:pPr>
-            <a:endParaRPr lang="en-US" sz="1600" dirty="0">
-              <a:latin typeface="Roboto" charset="0"/>
-              <a:ea typeface="Roboto" charset="0"/>
-              <a:cs typeface="Roboto" charset="0"/>
-            </a:endParaRPr>
-          </a:p>
-          <a:p>
-            <a:pPr marL="342900" indent="-342900">
-              <a:lnSpc>
-                <a:spcPct val="90000"/>
-              </a:lnSpc>
-              <a:spcAft>
-                <a:spcPts val="1000"/>
-              </a:spcAft>
-              <a:buFont typeface="Arial" panose="020B0604020202020204" pitchFamily="34" charset="0"/>
-              <a:buChar char="•"/>
-            </a:pPr>
-            <a:endParaRPr lang="en-US" sz="1600" dirty="0">
-              <a:latin typeface="Roboto" charset="0"/>
-              <a:ea typeface="Roboto" charset="0"/>
-              <a:cs typeface="Roboto" charset="0"/>
-            </a:endParaRPr>
-          </a:p>
-          <a:p>
-            <a:pPr marL="342900" indent="-342900">
-              <a:lnSpc>
-                <a:spcPct val="90000"/>
-              </a:lnSpc>
-              <a:spcAft>
-                <a:spcPts val="1000"/>
-              </a:spcAft>
-              <a:buFont typeface="Arial" panose="020B0604020202020204" pitchFamily="34" charset="0"/>
-              <a:buChar char="•"/>
-            </a:pPr>
-            <a:endParaRPr lang="en-US" sz="1600" dirty="0">
-              <a:latin typeface="Roboto" charset="0"/>
-              <a:ea typeface="Roboto" charset="0"/>
-              <a:cs typeface="Roboto" charset="0"/>
-            </a:endParaRPr>
-          </a:p>
-          <a:p>
-            <a:pPr marL="342900" indent="-342900">
-              <a:lnSpc>
-                <a:spcPct val="90000"/>
-              </a:lnSpc>
-              <a:spcAft>
-                <a:spcPts val="1000"/>
-              </a:spcAft>
-              <a:buFont typeface="Arial" panose="020B0604020202020204" pitchFamily="34" charset="0"/>
-              <a:buChar char="•"/>
-            </a:pPr>
-            <a:endParaRPr lang="en-US" sz="1600" dirty="0">
+            <a:endParaRPr lang="en-US" sz="1500" dirty="0">
               <a:latin typeface="Roboto" charset="0"/>
               <a:ea typeface="Roboto" charset="0"/>
               <a:cs typeface="Roboto" charset="0"/>
@@ -24408,7 +24647,7 @@
                 <a:spcPts val="1000"/>
               </a:spcAft>
             </a:pPr>
-            <a:endParaRPr lang="en-US" sz="1600" dirty="0">
+            <a:endParaRPr lang="en-US" sz="1500" dirty="0">
               <a:latin typeface="Roboto" charset="0"/>
               <a:ea typeface="Roboto" charset="0"/>
               <a:cs typeface="Roboto" charset="0"/>
@@ -24418,10 +24657,10 @@
       </p:sp>
       <p:graphicFrame>
         <p:nvGraphicFramePr>
-          <p:cNvPr id="2" name="Table 1">
+          <p:cNvPr id="3" name="Table 2">
             <a:extLst>
               <a:ext uri="{FF2B5EF4-FFF2-40B4-BE49-F238E27FC236}">
-                <a16:creationId xmlns:a16="http://schemas.microsoft.com/office/drawing/2014/main" id="{F4EB0FB1-37E1-B368-E480-B21F948E2AD9}"/>
+                <a16:creationId xmlns:a16="http://schemas.microsoft.com/office/drawing/2014/main" id="{BE90F69A-EA45-AE9D-6606-2A88FC566B3B}"/>
               </a:ext>
             </a:extLst>
           </p:cNvPr>
@@ -24431,14 +24670,14 @@
           <p:nvPr>
             <p:extLst>
               <p:ext uri="{D42A27DB-BD31-4B8C-83A1-F6EECF244321}">
-                <p14:modId xmlns:p14="http://schemas.microsoft.com/office/powerpoint/2010/main" val="527928439"/>
+                <p14:modId xmlns:p14="http://schemas.microsoft.com/office/powerpoint/2010/main" val="3616380919"/>
               </p:ext>
             </p:extLst>
           </p:nvPr>
         </p:nvGraphicFramePr>
         <p:xfrm>
-          <a:off x="1546049" y="1742092"/>
-          <a:ext cx="5633684" cy="301197"/>
+          <a:off x="5273467" y="1336484"/>
+          <a:ext cx="4340020" cy="261409"/>
         </p:xfrm>
         <a:graphic>
           <a:graphicData uri="http://schemas.openxmlformats.org/drawingml/2006/table">
@@ -24447,26 +24686,26 @@
                 <a:tableStyleId>{5C22544A-7EE6-4342-B048-85BDC9FD1C3A}</a:tableStyleId>
               </a:tblPr>
               <a:tblGrid>
-                <a:gridCol w="5633684">
+                <a:gridCol w="4340020">
                   <a:extLst>
                     <a:ext uri="{9D8B030D-6E8A-4147-A177-3AD203B41FA5}">
-                      <a16:colId xmlns:a16="http://schemas.microsoft.com/office/drawing/2014/main" val="3006732689"/>
+                      <a16:colId xmlns:a16="http://schemas.microsoft.com/office/drawing/2014/main" val="2725794101"/>
                     </a:ext>
                   </a:extLst>
                 </a:gridCol>
               </a:tblGrid>
-              <a:tr h="301197">
+              <a:tr h="261409">
                 <a:tc>
                   <a:txBody>
                     <a:bodyPr/>
                     <a:lstStyle/>
                     <a:p>
                       <a:r>
-                        <a:rPr lang="en-US" sz="1200" dirty="0">
+                        <a:rPr lang="en-US" sz="1000" dirty="0">
                           <a:latin typeface="Courier New" panose="02070309020205020404" pitchFamily="49" charset="0"/>
                           <a:cs typeface="Courier New" panose="02070309020205020404" pitchFamily="49" charset="0"/>
                         </a:rPr>
-                        <a:t>python simple_classification_creator.py extract</a:t>
+                        <a:t>python update_datasets.py my_config.csv</a:t>
                       </a:r>
                     </a:p>
                   </a:txBody>
@@ -24478,7 +24717,321 @@
                 </a:tc>
                 <a:extLst>
                   <a:ext uri="{0D108BD9-81ED-4DB2-BD59-A6C34878D82A}">
-                    <a16:rowId xmlns:a16="http://schemas.microsoft.com/office/drawing/2014/main" val="2155989993"/>
+                    <a16:rowId xmlns:a16="http://schemas.microsoft.com/office/drawing/2014/main" val="3942343172"/>
+                  </a:ext>
+                </a:extLst>
+              </a:tr>
+            </a:tbl>
+          </a:graphicData>
+        </a:graphic>
+      </p:graphicFrame>
+      <p:graphicFrame>
+        <p:nvGraphicFramePr>
+          <p:cNvPr id="4" name="Table 3">
+            <a:extLst>
+              <a:ext uri="{FF2B5EF4-FFF2-40B4-BE49-F238E27FC236}">
+                <a16:creationId xmlns:a16="http://schemas.microsoft.com/office/drawing/2014/main" id="{C64A84D4-6288-F146-CCD0-B7B36F60453A}"/>
+              </a:ext>
+            </a:extLst>
+          </p:cNvPr>
+          <p:cNvGraphicFramePr>
+            <a:graphicFrameLocks noGrp="1"/>
+          </p:cNvGraphicFramePr>
+          <p:nvPr>
+            <p:extLst>
+              <p:ext uri="{D42A27DB-BD31-4B8C-83A1-F6EECF244321}">
+                <p14:modId xmlns:p14="http://schemas.microsoft.com/office/powerpoint/2010/main" val="1170670622"/>
+              </p:ext>
+            </p:extLst>
+          </p:nvPr>
+        </p:nvGraphicFramePr>
+        <p:xfrm>
+          <a:off x="4360878" y="5388837"/>
+          <a:ext cx="2243809" cy="1188720"/>
+        </p:xfrm>
+        <a:graphic>
+          <a:graphicData uri="http://schemas.openxmlformats.org/drawingml/2006/table">
+            <a:tbl>
+              <a:tblPr firstRow="1" bandRow="1">
+                <a:tableStyleId>{5C22544A-7EE6-4342-B048-85BDC9FD1C3A}</a:tableStyleId>
+              </a:tblPr>
+              <a:tblGrid>
+                <a:gridCol w="2243809">
+                  <a:extLst>
+                    <a:ext uri="{9D8B030D-6E8A-4147-A177-3AD203B41FA5}">
+                      <a16:colId xmlns:a16="http://schemas.microsoft.com/office/drawing/2014/main" val="1261491639"/>
+                    </a:ext>
+                  </a:extLst>
+                </a:gridCol>
+              </a:tblGrid>
+              <a:tr h="1176498">
+                <a:tc>
+                  <a:txBody>
+                    <a:bodyPr/>
+                    <a:lstStyle/>
+                    <a:p>
+                      <a:r>
+                        <a:rPr lang="en-US" sz="800" b="0" dirty="0">
+                          <a:solidFill>
+                            <a:schemeClr val="bg2"/>
+                          </a:solidFill>
+                          <a:latin typeface="Courier New" panose="02070309020205020404" pitchFamily="49" charset="0"/>
+                          <a:cs typeface="Courier New" panose="02070309020205020404" pitchFamily="49" charset="0"/>
+                        </a:rPr>
+                        <a:t>[default1]</a:t>
+                      </a:r>
+                    </a:p>
+                    <a:p>
+                      <a:r>
+                        <a:rPr lang="en-US" sz="800" b="0" dirty="0">
+                          <a:solidFill>
+                            <a:schemeClr val="bg2"/>
+                          </a:solidFill>
+                          <a:latin typeface="Courier New" panose="02070309020205020404" pitchFamily="49" charset="0"/>
+                          <a:cs typeface="Courier New" panose="02070309020205020404" pitchFamily="49" charset="0"/>
+                        </a:rPr>
+                        <a:t>pod = </a:t>
+                      </a:r>
+                      <a:r>
+                        <a:rPr lang="en-US" sz="800" b="0" dirty="0" err="1">
+                          <a:solidFill>
+                            <a:schemeClr val="bg2"/>
+                          </a:solidFill>
+                          <a:latin typeface="Courier New" panose="02070309020205020404" pitchFamily="49" charset="0"/>
+                          <a:cs typeface="Courier New" panose="02070309020205020404" pitchFamily="49" charset="0"/>
+                        </a:rPr>
+                        <a:t>dmp</a:t>
+                      </a:r>
+                      <a:r>
+                        <a:rPr lang="en-US" sz="800" b="0" dirty="0">
+                          <a:solidFill>
+                            <a:schemeClr val="bg2"/>
+                          </a:solidFill>
+                          <a:latin typeface="Courier New" panose="02070309020205020404" pitchFamily="49" charset="0"/>
+                          <a:cs typeface="Courier New" panose="02070309020205020404" pitchFamily="49" charset="0"/>
+                        </a:rPr>
+                        <a:t>-us</a:t>
+                      </a:r>
+                    </a:p>
+                    <a:p>
+                      <a:r>
+                        <a:rPr lang="en-US" sz="800" b="0" dirty="0">
+                          <a:solidFill>
+                            <a:schemeClr val="bg2"/>
+                          </a:solidFill>
+                          <a:latin typeface="Courier New" panose="02070309020205020404" pitchFamily="49" charset="0"/>
+                          <a:cs typeface="Courier New" panose="02070309020205020404" pitchFamily="49" charset="0"/>
+                        </a:rPr>
+                        <a:t>user = </a:t>
+                      </a:r>
+                      <a:r>
+                        <a:rPr lang="en-US" sz="800" b="0" dirty="0" err="1">
+                          <a:solidFill>
+                            <a:schemeClr val="bg2"/>
+                          </a:solidFill>
+                          <a:latin typeface="Courier New" panose="02070309020205020404" pitchFamily="49" charset="0"/>
+                          <a:cs typeface="Courier New" panose="02070309020205020404" pitchFamily="49" charset="0"/>
+                        </a:rPr>
+                        <a:t>shayes_example</a:t>
+                      </a:r>
+                      <a:endParaRPr lang="en-US" sz="800" b="0" dirty="0">
+                        <a:solidFill>
+                          <a:schemeClr val="bg2"/>
+                        </a:solidFill>
+                        <a:latin typeface="Courier New" panose="02070309020205020404" pitchFamily="49" charset="0"/>
+                        <a:cs typeface="Courier New" panose="02070309020205020404" pitchFamily="49" charset="0"/>
+                      </a:endParaRPr>
+                    </a:p>
+                    <a:p>
+                      <a:r>
+                        <a:rPr lang="en-US" sz="800" b="0" dirty="0" err="1">
+                          <a:solidFill>
+                            <a:schemeClr val="bg2"/>
+                          </a:solidFill>
+                          <a:latin typeface="Courier New" panose="02070309020205020404" pitchFamily="49" charset="0"/>
+                          <a:cs typeface="Courier New" panose="02070309020205020404" pitchFamily="49" charset="0"/>
+                        </a:rPr>
+                        <a:t>pwd</a:t>
+                      </a:r>
+                      <a:r>
+                        <a:rPr lang="en-US" sz="800" b="0" dirty="0">
+                          <a:solidFill>
+                            <a:schemeClr val="bg2"/>
+                          </a:solidFill>
+                          <a:latin typeface="Courier New" panose="02070309020205020404" pitchFamily="49" charset="0"/>
+                          <a:cs typeface="Courier New" panose="02070309020205020404" pitchFamily="49" charset="0"/>
+                        </a:rPr>
+                        <a:t> = </a:t>
+                      </a:r>
+                      <a:r>
+                        <a:rPr lang="en-US" sz="800" b="0" dirty="0" err="1">
+                          <a:solidFill>
+                            <a:schemeClr val="bg2"/>
+                          </a:solidFill>
+                          <a:latin typeface="Courier New" panose="02070309020205020404" pitchFamily="49" charset="0"/>
+                          <a:cs typeface="Courier New" panose="02070309020205020404" pitchFamily="49" charset="0"/>
+                        </a:rPr>
+                        <a:t>xyz</a:t>
+                      </a:r>
+                      <a:endParaRPr lang="en-US" sz="800" b="0" dirty="0">
+                        <a:solidFill>
+                          <a:schemeClr val="bg2"/>
+                        </a:solidFill>
+                        <a:latin typeface="Courier New" panose="02070309020205020404" pitchFamily="49" charset="0"/>
+                        <a:cs typeface="Courier New" panose="02070309020205020404" pitchFamily="49" charset="0"/>
+                      </a:endParaRPr>
+                    </a:p>
+                    <a:p>
+                      <a:endParaRPr lang="en-US" sz="800" b="0" dirty="0">
+                        <a:solidFill>
+                          <a:schemeClr val="bg2"/>
+                        </a:solidFill>
+                        <a:latin typeface="Courier New" panose="02070309020205020404" pitchFamily="49" charset="0"/>
+                        <a:cs typeface="Courier New" panose="02070309020205020404" pitchFamily="49" charset="0"/>
+                      </a:endParaRPr>
+                    </a:p>
+                    <a:p>
+                      <a:r>
+                        <a:rPr lang="en-US" sz="800" b="0" dirty="0">
+                          <a:solidFill>
+                            <a:schemeClr val="bg2"/>
+                          </a:solidFill>
+                          <a:latin typeface="Courier New" panose="02070309020205020404" pitchFamily="49" charset="0"/>
+                          <a:cs typeface="Courier New" panose="02070309020205020404" pitchFamily="49" charset="0"/>
+                        </a:rPr>
+                        <a:t>[</a:t>
+                      </a:r>
+                      <a:r>
+                        <a:rPr lang="en-US" sz="800" b="0" dirty="0" err="1">
+                          <a:solidFill>
+                            <a:schemeClr val="bg2"/>
+                          </a:solidFill>
+                          <a:latin typeface="Courier New" panose="02070309020205020404" pitchFamily="49" charset="0"/>
+                          <a:cs typeface="Courier New" panose="02070309020205020404" pitchFamily="49" charset="0"/>
+                        </a:rPr>
+                        <a:t>shayes_compass</a:t>
+                      </a:r>
+                      <a:r>
+                        <a:rPr lang="en-US" sz="800" b="0" dirty="0">
+                          <a:solidFill>
+                            <a:schemeClr val="bg2"/>
+                          </a:solidFill>
+                          <a:latin typeface="Courier New" panose="02070309020205020404" pitchFamily="49" charset="0"/>
+                          <a:cs typeface="Courier New" panose="02070309020205020404" pitchFamily="49" charset="0"/>
+                        </a:rPr>
+                        <a:t>]</a:t>
+                      </a:r>
+                    </a:p>
+                    <a:p>
+                      <a:r>
+                        <a:rPr lang="en-US" sz="800" b="0" dirty="0">
+                          <a:solidFill>
+                            <a:schemeClr val="bg2"/>
+                          </a:solidFill>
+                          <a:latin typeface="Courier New" panose="02070309020205020404" pitchFamily="49" charset="0"/>
+                          <a:cs typeface="Courier New" panose="02070309020205020404" pitchFamily="49" charset="0"/>
+                        </a:rPr>
+                        <a:t>pod = </a:t>
+                      </a:r>
+                      <a:r>
+                        <a:rPr lang="en-US" sz="800" b="0" dirty="0" err="1">
+                          <a:solidFill>
+                            <a:schemeClr val="bg2"/>
+                          </a:solidFill>
+                          <a:latin typeface="Courier New" panose="02070309020205020404" pitchFamily="49" charset="0"/>
+                          <a:cs typeface="Courier New" panose="02070309020205020404" pitchFamily="49" charset="0"/>
+                        </a:rPr>
+                        <a:t>dmp</a:t>
+                      </a:r>
+                      <a:r>
+                        <a:rPr lang="en-US" sz="800" b="0" dirty="0">
+                          <a:solidFill>
+                            <a:schemeClr val="bg2"/>
+                          </a:solidFill>
+                          <a:latin typeface="Courier New" panose="02070309020205020404" pitchFamily="49" charset="0"/>
+                          <a:cs typeface="Courier New" panose="02070309020205020404" pitchFamily="49" charset="0"/>
+                        </a:rPr>
+                        <a:t>-us</a:t>
+                      </a:r>
+                    </a:p>
+                    <a:p>
+                      <a:r>
+                        <a:rPr lang="en-US" sz="800" b="0" dirty="0">
+                          <a:solidFill>
+                            <a:schemeClr val="bg2"/>
+                          </a:solidFill>
+                          <a:latin typeface="Courier New" panose="02070309020205020404" pitchFamily="49" charset="0"/>
+                          <a:cs typeface="Courier New" panose="02070309020205020404" pitchFamily="49" charset="0"/>
+                        </a:rPr>
+                        <a:t>user = </a:t>
+                      </a:r>
+                      <a:r>
+                        <a:rPr lang="en-US" sz="800" b="0" dirty="0" err="1">
+                          <a:solidFill>
+                            <a:schemeClr val="bg2"/>
+                          </a:solidFill>
+                          <a:latin typeface="Courier New" panose="02070309020205020404" pitchFamily="49" charset="0"/>
+                          <a:cs typeface="Courier New" panose="02070309020205020404" pitchFamily="49" charset="0"/>
+                        </a:rPr>
+                        <a:t>shayes_compass</a:t>
+                      </a:r>
+                      <a:endParaRPr lang="en-US" sz="800" b="0" dirty="0">
+                        <a:solidFill>
+                          <a:schemeClr val="bg2"/>
+                        </a:solidFill>
+                        <a:latin typeface="Courier New" panose="02070309020205020404" pitchFamily="49" charset="0"/>
+                        <a:cs typeface="Courier New" panose="02070309020205020404" pitchFamily="49" charset="0"/>
+                      </a:endParaRPr>
+                    </a:p>
+                    <a:p>
+                      <a:r>
+                        <a:rPr lang="en-US" sz="800" b="0" dirty="0" err="1">
+                          <a:solidFill>
+                            <a:schemeClr val="bg2"/>
+                          </a:solidFill>
+                          <a:latin typeface="Courier New" panose="02070309020205020404" pitchFamily="49" charset="0"/>
+                          <a:cs typeface="Courier New" panose="02070309020205020404" pitchFamily="49" charset="0"/>
+                        </a:rPr>
+                        <a:t>pwd</a:t>
+                      </a:r>
+                      <a:r>
+                        <a:rPr lang="en-US" sz="800" b="0" dirty="0">
+                          <a:solidFill>
+                            <a:schemeClr val="bg2"/>
+                          </a:solidFill>
+                          <a:latin typeface="Courier New" panose="02070309020205020404" pitchFamily="49" charset="0"/>
+                          <a:cs typeface="Courier New" panose="02070309020205020404" pitchFamily="49" charset="0"/>
+                        </a:rPr>
+                        <a:t> = </a:t>
+                      </a:r>
+                      <a:r>
+                        <a:rPr lang="en-US" sz="800" b="0" dirty="0" err="1">
+                          <a:solidFill>
+                            <a:schemeClr val="bg2"/>
+                          </a:solidFill>
+                          <a:latin typeface="Courier New" panose="02070309020205020404" pitchFamily="49" charset="0"/>
+                          <a:cs typeface="Courier New" panose="02070309020205020404" pitchFamily="49" charset="0"/>
+                        </a:rPr>
+                        <a:t>abc</a:t>
+                      </a:r>
+                      <a:endParaRPr lang="en-US" sz="800" b="0" dirty="0">
+                        <a:solidFill>
+                          <a:schemeClr val="bg2"/>
+                        </a:solidFill>
+                        <a:latin typeface="Courier New" panose="02070309020205020404" pitchFamily="49" charset="0"/>
+                        <a:cs typeface="Courier New" panose="02070309020205020404" pitchFamily="49" charset="0"/>
+                      </a:endParaRPr>
+                    </a:p>
+                  </a:txBody>
+                  <a:tcPr>
+                    <a:solidFill>
+                      <a:schemeClr val="tx1"/>
+                    </a:solidFill>
+                  </a:tcPr>
+                </a:tc>
+                <a:extLst>
+                  <a:ext uri="{0D108BD9-81ED-4DB2-BD59-A6C34878D82A}">
+                    <a16:rowId xmlns:a16="http://schemas.microsoft.com/office/drawing/2014/main" val="3598110298"/>
                   </a:ext>
                 </a:extLst>
               </a:tr>
@@ -24488,10 +25041,10 @@
       </p:graphicFrame>
       <p:pic>
         <p:nvPicPr>
-          <p:cNvPr id="4" name="Picture 3">
+          <p:cNvPr id="10" name="Picture 9">
             <a:extLst>
               <a:ext uri="{FF2B5EF4-FFF2-40B4-BE49-F238E27FC236}">
-                <a16:creationId xmlns:a16="http://schemas.microsoft.com/office/drawing/2014/main" id="{6F07247B-728C-392F-C430-EED18C2D468B}"/>
+                <a16:creationId xmlns:a16="http://schemas.microsoft.com/office/drawing/2014/main" id="{E3BFDB88-8AE4-3CF8-36F5-74C839D43143}"/>
               </a:ext>
             </a:extLst>
           </p:cNvPr>
@@ -24508,120 +25061,25 @@
         </p:blipFill>
         <p:spPr>
           <a:xfrm>
-            <a:off x="8133568" y="3738014"/>
-            <a:ext cx="3324225" cy="1247775"/>
+            <a:off x="8426129" y="1802499"/>
+            <a:ext cx="3009900" cy="1009650"/>
           </a:xfrm>
           <a:prstGeom prst="rect">
             <a:avLst/>
           </a:prstGeom>
+          <a:effectLst>
+            <a:outerShdw blurRad="50800" dist="38100" dir="2700000" algn="tl" rotWithShape="0">
+              <a:prstClr val="black">
+                <a:alpha val="40000"/>
+              </a:prstClr>
+            </a:outerShdw>
+          </a:effectLst>
         </p:spPr>
       </p:pic>
-      <p:graphicFrame>
-        <p:nvGraphicFramePr>
-          <p:cNvPr id="7" name="Table 6">
-            <a:extLst>
-              <a:ext uri="{FF2B5EF4-FFF2-40B4-BE49-F238E27FC236}">
-                <a16:creationId xmlns:a16="http://schemas.microsoft.com/office/drawing/2014/main" id="{8BD00691-CC8B-F23F-0A76-A5FCECB5FC8D}"/>
-              </a:ext>
-            </a:extLst>
-          </p:cNvPr>
-          <p:cNvGraphicFramePr>
-            <a:graphicFrameLocks noGrp="1"/>
-          </p:cNvGraphicFramePr>
-          <p:nvPr>
-            <p:extLst>
-              <p:ext uri="{D42A27DB-BD31-4B8C-83A1-F6EECF244321}">
-                <p14:modId xmlns:p14="http://schemas.microsoft.com/office/powerpoint/2010/main" val="1641305193"/>
-              </p:ext>
-            </p:extLst>
-          </p:nvPr>
-        </p:nvGraphicFramePr>
-        <p:xfrm>
-          <a:off x="1546049" y="3728998"/>
-          <a:ext cx="6445588" cy="640080"/>
-        </p:xfrm>
-        <a:graphic>
-          <a:graphicData uri="http://schemas.openxmlformats.org/drawingml/2006/table">
-            <a:tbl>
-              <a:tblPr firstRow="1" bandRow="1">
-                <a:tableStyleId>{5C22544A-7EE6-4342-B048-85BDC9FD1C3A}</a:tableStyleId>
-              </a:tblPr>
-              <a:tblGrid>
-                <a:gridCol w="6445588">
-                  <a:extLst>
-                    <a:ext uri="{9D8B030D-6E8A-4147-A177-3AD203B41FA5}">
-                      <a16:colId xmlns:a16="http://schemas.microsoft.com/office/drawing/2014/main" val="3006732689"/>
-                    </a:ext>
-                  </a:extLst>
-                </a:gridCol>
-              </a:tblGrid>
-              <a:tr h="593902">
-                <a:tc>
-                  <a:txBody>
-                    <a:bodyPr/>
-                    <a:lstStyle/>
-                    <a:p>
-                      <a:r>
-                        <a:rPr lang="en-US" sz="1200" dirty="0">
-                          <a:latin typeface="Courier New" panose="02070309020205020404" pitchFamily="49" charset="0"/>
-                          <a:cs typeface="Courier New" panose="02070309020205020404" pitchFamily="49" charset="0"/>
-                        </a:rPr>
-                        <a:t>python simple_classification_creator.py delete</a:t>
-                      </a:r>
-                    </a:p>
-                    <a:p>
-                      <a:pPr marL="0" marR="0" lvl="0" indent="0" algn="l" defTabSz="914217" rtl="0" eaLnBrk="1" fontAlgn="auto" latinLnBrk="0" hangingPunct="1">
-                        <a:lnSpc>
-                          <a:spcPct val="100000"/>
-                        </a:lnSpc>
-                        <a:spcBef>
-                          <a:spcPts val="0"/>
-                        </a:spcBef>
-                        <a:spcAft>
-                          <a:spcPts val="0"/>
-                        </a:spcAft>
-                        <a:buClrTx/>
-                        <a:buSzTx/>
-                        <a:buFontTx/>
-                        <a:buNone/>
-                        <a:tabLst/>
-                        <a:defRPr/>
-                      </a:pPr>
-                      <a:r>
-                        <a:rPr lang="en-US" sz="1200" dirty="0">
-                          <a:latin typeface="Courier New" panose="02070309020205020404" pitchFamily="49" charset="0"/>
-                          <a:cs typeface="Courier New" panose="02070309020205020404" pitchFamily="49" charset="0"/>
-                        </a:rPr>
-                        <a:t>python simple_classification_creator.py delete my_delete_file.csv</a:t>
-                      </a:r>
-                    </a:p>
-                    <a:p>
-                      <a:endParaRPr lang="en-US" sz="1200" dirty="0">
-                        <a:latin typeface="Courier New" panose="02070309020205020404" pitchFamily="49" charset="0"/>
-                        <a:cs typeface="Courier New" panose="02070309020205020404" pitchFamily="49" charset="0"/>
-                      </a:endParaRPr>
-                    </a:p>
-                  </a:txBody>
-                  <a:tcPr>
-                    <a:solidFill>
-                      <a:schemeClr val="tx1"/>
-                    </a:solidFill>
-                  </a:tcPr>
-                </a:tc>
-                <a:extLst>
-                  <a:ext uri="{0D108BD9-81ED-4DB2-BD59-A6C34878D82A}">
-                    <a16:rowId xmlns:a16="http://schemas.microsoft.com/office/drawing/2014/main" val="2155989993"/>
-                  </a:ext>
-                </a:extLst>
-              </a:tr>
-            </a:tbl>
-          </a:graphicData>
-        </a:graphic>
-      </p:graphicFrame>
     </p:spTree>
     <p:extLst>
       <p:ext uri="{BB962C8B-B14F-4D97-AF65-F5344CB8AC3E}">
-        <p14:creationId xmlns:p14="http://schemas.microsoft.com/office/powerpoint/2010/main" val="2126644930"/>
+        <p14:creationId xmlns:p14="http://schemas.microsoft.com/office/powerpoint/2010/main" val="1185346069"/>
       </p:ext>
     </p:extLst>
   </p:cSld>
@@ -24683,7 +25141,7 @@
           <a:p>
             <a:r>
               <a:rPr lang="en-US" dirty="0"/>
-              <a:t>Additional Information</a:t>
+              <a:t>Output</a:t>
             </a:r>
             <a:endParaRPr lang="en-IN" dirty="0"/>
           </a:p>
@@ -24956,975 +25414,6 @@
         </p:nvSpPr>
         <p:spPr>
           <a:xfrm>
-            <a:off x="708454" y="1051480"/>
-            <a:ext cx="11195177" cy="5412215"/>
-          </a:xfrm>
-          <a:prstGeom prst="rect">
-            <a:avLst/>
-          </a:prstGeom>
-          <a:noFill/>
-        </p:spPr>
-        <p:txBody>
-          <a:bodyPr wrap="square" lIns="0" tIns="0" rIns="0" bIns="0" rtlCol="0">
-            <a:noAutofit/>
-          </a:bodyPr>
-          <a:lstStyle/>
-          <a:p>
-            <a:pPr marL="342900" indent="-342900">
-              <a:lnSpc>
-                <a:spcPct val="90000"/>
-              </a:lnSpc>
-              <a:spcAft>
-                <a:spcPts val="1000"/>
-              </a:spcAft>
-              <a:buFont typeface="Arial" panose="020B0604020202020204" pitchFamily="34" charset="0"/>
-              <a:buChar char="•"/>
-            </a:pPr>
-            <a:r>
-              <a:rPr lang="en-US" sz="1500" dirty="0">
-                <a:latin typeface="Roboto" charset="0"/>
-                <a:ea typeface="Roboto" charset="0"/>
-                <a:cs typeface="Roboto" charset="0"/>
-              </a:rPr>
-              <a:t>By default, the script will look for a config.csv file, you optionally, you can also pass the name of your csv file as a command line parameter. For example:</a:t>
-            </a:r>
-          </a:p>
-          <a:p>
-            <a:pPr>
-              <a:lnSpc>
-                <a:spcPct val="90000"/>
-              </a:lnSpc>
-              <a:spcAft>
-                <a:spcPts val="1000"/>
-              </a:spcAft>
-            </a:pPr>
-            <a:endParaRPr lang="en-US" sz="1500" dirty="0">
-              <a:latin typeface="Roboto" charset="0"/>
-              <a:ea typeface="Roboto" charset="0"/>
-              <a:cs typeface="Roboto" charset="0"/>
-            </a:endParaRPr>
-          </a:p>
-          <a:p>
-            <a:pPr marL="342900" indent="-342900">
-              <a:lnSpc>
-                <a:spcPct val="90000"/>
-              </a:lnSpc>
-              <a:spcAft>
-                <a:spcPts val="1000"/>
-              </a:spcAft>
-              <a:buFont typeface="Arial" panose="020B0604020202020204" pitchFamily="34" charset="0"/>
-              <a:buChar char="•"/>
-            </a:pPr>
-            <a:r>
-              <a:rPr lang="en-US" sz="1500" dirty="0">
-                <a:latin typeface="Roboto" charset="0"/>
-                <a:ea typeface="Roboto" charset="0"/>
-                <a:cs typeface="Roboto" charset="0"/>
-              </a:rPr>
-              <a:t>Additional flags can be set on the script:</a:t>
-            </a:r>
-          </a:p>
-          <a:p>
-            <a:pPr marL="742950" lvl="1" indent="-285750">
-              <a:lnSpc>
-                <a:spcPct val="90000"/>
-              </a:lnSpc>
-              <a:spcAft>
-                <a:spcPts val="1000"/>
-              </a:spcAft>
-              <a:buFont typeface="Arial" panose="020B0604020202020204" pitchFamily="34" charset="0"/>
-              <a:buChar char="•"/>
-            </a:pPr>
-            <a:r>
-              <a:rPr lang="en-US" sz="1500" i="1" dirty="0" err="1">
-                <a:latin typeface="Roboto" charset="0"/>
-                <a:ea typeface="Roboto" charset="0"/>
-                <a:cs typeface="Roboto" charset="0"/>
-              </a:rPr>
-              <a:t>default_pod</a:t>
-            </a:r>
-            <a:r>
-              <a:rPr lang="en-US" sz="1500" dirty="0">
-                <a:latin typeface="Roboto" charset="0"/>
-                <a:ea typeface="Roboto" charset="0"/>
-                <a:cs typeface="Roboto" charset="0"/>
-              </a:rPr>
-              <a:t>. Set this to the default Informatica POD to use. Example: dm-us</a:t>
-            </a:r>
-          </a:p>
-          <a:p>
-            <a:pPr marL="742950" lvl="1" indent="-285750">
-              <a:lnSpc>
-                <a:spcPct val="90000"/>
-              </a:lnSpc>
-              <a:spcAft>
-                <a:spcPts val="1000"/>
-              </a:spcAft>
-              <a:buFont typeface="Arial" panose="020B0604020202020204" pitchFamily="34" charset="0"/>
-              <a:buChar char="•"/>
-            </a:pPr>
-            <a:r>
-              <a:rPr lang="en-US" sz="1500" i="1" dirty="0" err="1">
-                <a:latin typeface="Roboto" charset="0"/>
-                <a:ea typeface="Roboto" charset="0"/>
-                <a:cs typeface="Roboto" charset="0"/>
-              </a:rPr>
-              <a:t>default_user</a:t>
-            </a:r>
-            <a:r>
-              <a:rPr lang="en-US" sz="1500" dirty="0">
-                <a:latin typeface="Roboto" charset="0"/>
-                <a:ea typeface="Roboto" charset="0"/>
-                <a:cs typeface="Roboto" charset="0"/>
-              </a:rPr>
-              <a:t>. Set this to the default user to use. Example: </a:t>
-            </a:r>
-            <a:r>
-              <a:rPr lang="en-US" sz="1500" dirty="0" err="1">
-                <a:latin typeface="Roboto" charset="0"/>
-                <a:ea typeface="Roboto" charset="0"/>
-                <a:cs typeface="Roboto" charset="0"/>
-              </a:rPr>
-              <a:t>shayes_compass</a:t>
-            </a:r>
-            <a:endParaRPr lang="en-US" sz="1500" dirty="0">
-              <a:latin typeface="Roboto" charset="0"/>
-              <a:ea typeface="Roboto" charset="0"/>
-              <a:cs typeface="Roboto" charset="0"/>
-            </a:endParaRPr>
-          </a:p>
-          <a:p>
-            <a:pPr marL="742950" lvl="1" indent="-285750">
-              <a:lnSpc>
-                <a:spcPct val="90000"/>
-              </a:lnSpc>
-              <a:spcAft>
-                <a:spcPts val="1000"/>
-              </a:spcAft>
-              <a:buFont typeface="Arial" panose="020B0604020202020204" pitchFamily="34" charset="0"/>
-              <a:buChar char="•"/>
-            </a:pPr>
-            <a:r>
-              <a:rPr lang="en-US" sz="1500" i="1" dirty="0" err="1">
-                <a:latin typeface="Roboto" charset="0"/>
-                <a:ea typeface="Roboto" charset="0"/>
-                <a:cs typeface="Roboto" charset="0"/>
-              </a:rPr>
-              <a:t>default_pwd</a:t>
-            </a:r>
-            <a:r>
-              <a:rPr lang="en-US" sz="1500" i="1" dirty="0">
-                <a:latin typeface="Roboto" charset="0"/>
-                <a:ea typeface="Roboto" charset="0"/>
-                <a:cs typeface="Roboto" charset="0"/>
-              </a:rPr>
-              <a:t>. </a:t>
-            </a:r>
-            <a:r>
-              <a:rPr lang="en-US" sz="1500" dirty="0">
-                <a:latin typeface="Roboto" charset="0"/>
-                <a:ea typeface="Roboto" charset="0"/>
-                <a:cs typeface="Roboto" charset="0"/>
-              </a:rPr>
-              <a:t>Set this to the default password to use. Example: 1234</a:t>
-            </a:r>
-          </a:p>
-          <a:p>
-            <a:pPr marL="742950" lvl="1" indent="-285750">
-              <a:lnSpc>
-                <a:spcPct val="90000"/>
-              </a:lnSpc>
-              <a:spcAft>
-                <a:spcPts val="1000"/>
-              </a:spcAft>
-              <a:buFont typeface="Arial" panose="020B0604020202020204" pitchFamily="34" charset="0"/>
-              <a:buChar char="•"/>
-            </a:pPr>
-            <a:endParaRPr lang="en-US" sz="1500" dirty="0">
-              <a:latin typeface="Roboto" charset="0"/>
-              <a:ea typeface="Roboto" charset="0"/>
-              <a:cs typeface="Roboto" charset="0"/>
-            </a:endParaRPr>
-          </a:p>
-          <a:p>
-            <a:pPr marL="742950" lvl="1" indent="-285750">
-              <a:lnSpc>
-                <a:spcPct val="90000"/>
-              </a:lnSpc>
-              <a:spcAft>
-                <a:spcPts val="1000"/>
-              </a:spcAft>
-              <a:buFont typeface="Arial" panose="020B0604020202020204" pitchFamily="34" charset="0"/>
-              <a:buChar char="•"/>
-            </a:pPr>
-            <a:r>
-              <a:rPr lang="en-US" sz="1500" i="1" dirty="0" err="1">
-                <a:latin typeface="Roboto" charset="0"/>
-                <a:ea typeface="Roboto" charset="0"/>
-                <a:cs typeface="Roboto" charset="0"/>
-              </a:rPr>
-              <a:t>prompt_for_login_info</a:t>
-            </a:r>
-            <a:r>
-              <a:rPr lang="en-US" sz="1500" dirty="0">
-                <a:latin typeface="Roboto" charset="0"/>
-                <a:ea typeface="Roboto" charset="0"/>
-                <a:cs typeface="Roboto" charset="0"/>
-              </a:rPr>
-              <a:t>. True/False. Whether or not to prompt. If False, will not prompt, unless default is not set</a:t>
-            </a:r>
-          </a:p>
-          <a:p>
-            <a:pPr marL="742950" lvl="1" indent="-285750">
-              <a:lnSpc>
-                <a:spcPct val="90000"/>
-              </a:lnSpc>
-              <a:spcAft>
-                <a:spcPts val="1000"/>
-              </a:spcAft>
-              <a:buFont typeface="Arial" panose="020B0604020202020204" pitchFamily="34" charset="0"/>
-              <a:buChar char="•"/>
-            </a:pPr>
-            <a:r>
-              <a:rPr lang="en-US" sz="1500" i="1" dirty="0" err="1">
-                <a:latin typeface="Roboto" charset="0"/>
-                <a:ea typeface="Roboto" charset="0"/>
-                <a:cs typeface="Roboto" charset="0"/>
-              </a:rPr>
-              <a:t>pause_before_loading</a:t>
-            </a:r>
-            <a:r>
-              <a:rPr lang="en-US" sz="1500" i="1" dirty="0">
-                <a:latin typeface="Roboto" charset="0"/>
-                <a:ea typeface="Roboto" charset="0"/>
-                <a:cs typeface="Roboto" charset="0"/>
-              </a:rPr>
-              <a:t>. </a:t>
-            </a:r>
-            <a:r>
-              <a:rPr lang="en-US" sz="1500" dirty="0">
-                <a:latin typeface="Roboto" charset="0"/>
-                <a:ea typeface="Roboto" charset="0"/>
-                <a:cs typeface="Roboto" charset="0"/>
-              </a:rPr>
-              <a:t>True/False. Whether or not to pause after payload files are created, before loading the  classifications.</a:t>
-            </a:r>
-          </a:p>
-          <a:p>
-            <a:pPr marL="742950" lvl="1" indent="-285750">
-              <a:lnSpc>
-                <a:spcPct val="90000"/>
-              </a:lnSpc>
-              <a:spcAft>
-                <a:spcPts val="1000"/>
-              </a:spcAft>
-              <a:buFont typeface="Arial" panose="020B0604020202020204" pitchFamily="34" charset="0"/>
-              <a:buChar char="•"/>
-            </a:pPr>
-            <a:r>
-              <a:rPr lang="en-US" sz="1500" i="1" dirty="0" err="1">
-                <a:latin typeface="Roboto" charset="0"/>
-                <a:ea typeface="Roboto" charset="0"/>
-                <a:cs typeface="Roboto" charset="0"/>
-              </a:rPr>
-              <a:t>show_raw_errors</a:t>
-            </a:r>
-            <a:r>
-              <a:rPr lang="en-US" sz="1500" dirty="0">
-                <a:latin typeface="Roboto" charset="0"/>
-                <a:ea typeface="Roboto" charset="0"/>
-                <a:cs typeface="Roboto" charset="0"/>
-              </a:rPr>
-              <a:t>. True/False. If set to True, it will always show raw errors if they occur. Otherwise, it will attempt to find the message from the error, and display that.</a:t>
-            </a:r>
-          </a:p>
-          <a:p>
-            <a:pPr marL="742950" lvl="1" indent="-285750">
-              <a:lnSpc>
-                <a:spcPct val="90000"/>
-              </a:lnSpc>
-              <a:spcAft>
-                <a:spcPts val="1000"/>
-              </a:spcAft>
-              <a:buFont typeface="Arial" panose="020B0604020202020204" pitchFamily="34" charset="0"/>
-              <a:buChar char="•"/>
-            </a:pPr>
-            <a:endParaRPr lang="en-US" sz="1500" dirty="0">
-              <a:latin typeface="Roboto" charset="0"/>
-              <a:ea typeface="Roboto" charset="0"/>
-              <a:cs typeface="Roboto" charset="0"/>
-            </a:endParaRPr>
-          </a:p>
-          <a:p>
-            <a:pPr marL="285750" indent="-285750">
-              <a:lnSpc>
-                <a:spcPct val="90000"/>
-              </a:lnSpc>
-              <a:spcAft>
-                <a:spcPts val="1000"/>
-              </a:spcAft>
-              <a:buFont typeface="Arial" panose="020B0604020202020204" pitchFamily="34" charset="0"/>
-              <a:buChar char="•"/>
-            </a:pPr>
-            <a:r>
-              <a:rPr lang="en-US" sz="1500" dirty="0">
-                <a:latin typeface="Roboto" charset="0"/>
-                <a:ea typeface="Roboto" charset="0"/>
-                <a:cs typeface="Roboto" charset="0"/>
-              </a:rPr>
-              <a:t>If desired, you can create a </a:t>
-            </a:r>
-            <a:r>
-              <a:rPr lang="en-US" sz="1500" dirty="0" err="1">
-                <a:latin typeface="Roboto" charset="0"/>
-                <a:ea typeface="Roboto" charset="0"/>
-                <a:cs typeface="Roboto" charset="0"/>
-              </a:rPr>
-              <a:t>credentials.json</a:t>
-            </a:r>
-            <a:r>
-              <a:rPr lang="en-US" sz="1500" dirty="0">
-                <a:latin typeface="Roboto" charset="0"/>
-                <a:ea typeface="Roboto" charset="0"/>
-                <a:cs typeface="Roboto" charset="0"/>
-              </a:rPr>
-              <a:t> to save your defaults in ~/.</a:t>
-            </a:r>
-            <a:r>
-              <a:rPr lang="en-US" sz="1500" dirty="0" err="1">
-                <a:latin typeface="Roboto" charset="0"/>
-                <a:ea typeface="Roboto" charset="0"/>
-                <a:cs typeface="Roboto" charset="0"/>
-              </a:rPr>
-              <a:t>informatica_cdgc</a:t>
-            </a:r>
-            <a:r>
-              <a:rPr lang="en-US" sz="1500" dirty="0">
-                <a:latin typeface="Roboto" charset="0"/>
-                <a:ea typeface="Roboto" charset="0"/>
-                <a:cs typeface="Roboto" charset="0"/>
-              </a:rPr>
-              <a:t> path. Example of that file is:</a:t>
-            </a:r>
-          </a:p>
-          <a:p>
-            <a:pPr marL="742950" lvl="1" indent="-285750">
-              <a:lnSpc>
-                <a:spcPct val="90000"/>
-              </a:lnSpc>
-              <a:spcAft>
-                <a:spcPts val="1000"/>
-              </a:spcAft>
-              <a:buFont typeface="Arial" panose="020B0604020202020204" pitchFamily="34" charset="0"/>
-              <a:buChar char="•"/>
-            </a:pPr>
-            <a:endParaRPr lang="en-US" sz="1500" dirty="0">
-              <a:latin typeface="Roboto" charset="0"/>
-              <a:ea typeface="Roboto" charset="0"/>
-              <a:cs typeface="Roboto" charset="0"/>
-            </a:endParaRPr>
-          </a:p>
-          <a:p>
-            <a:pPr>
-              <a:lnSpc>
-                <a:spcPct val="90000"/>
-              </a:lnSpc>
-              <a:spcAft>
-                <a:spcPts val="1000"/>
-              </a:spcAft>
-            </a:pPr>
-            <a:endParaRPr lang="en-US" sz="1500" dirty="0">
-              <a:latin typeface="Roboto" charset="0"/>
-              <a:ea typeface="Roboto" charset="0"/>
-              <a:cs typeface="Roboto" charset="0"/>
-            </a:endParaRPr>
-          </a:p>
-        </p:txBody>
-      </p:sp>
-      <p:graphicFrame>
-        <p:nvGraphicFramePr>
-          <p:cNvPr id="2" name="Table 1">
-            <a:extLst>
-              <a:ext uri="{FF2B5EF4-FFF2-40B4-BE49-F238E27FC236}">
-                <a16:creationId xmlns:a16="http://schemas.microsoft.com/office/drawing/2014/main" id="{96694F0C-77E8-1BF7-D208-E1FC1D0DD407}"/>
-              </a:ext>
-            </a:extLst>
-          </p:cNvPr>
-          <p:cNvGraphicFramePr>
-            <a:graphicFrameLocks noGrp="1"/>
-          </p:cNvGraphicFramePr>
-          <p:nvPr>
-            <p:extLst>
-              <p:ext uri="{D42A27DB-BD31-4B8C-83A1-F6EECF244321}">
-                <p14:modId xmlns:p14="http://schemas.microsoft.com/office/powerpoint/2010/main" val="2832037700"/>
-              </p:ext>
-            </p:extLst>
-          </p:nvPr>
-        </p:nvGraphicFramePr>
-        <p:xfrm>
-          <a:off x="1462468" y="5521958"/>
-          <a:ext cx="4340020" cy="853440"/>
-        </p:xfrm>
-        <a:graphic>
-          <a:graphicData uri="http://schemas.openxmlformats.org/drawingml/2006/table">
-            <a:tbl>
-              <a:tblPr firstRow="1" bandRow="1">
-                <a:tableStyleId>{5C22544A-7EE6-4342-B048-85BDC9FD1C3A}</a:tableStyleId>
-              </a:tblPr>
-              <a:tblGrid>
-                <a:gridCol w="4340020">
-                  <a:extLst>
-                    <a:ext uri="{9D8B030D-6E8A-4147-A177-3AD203B41FA5}">
-                      <a16:colId xmlns:a16="http://schemas.microsoft.com/office/drawing/2014/main" val="2725794101"/>
-                    </a:ext>
-                  </a:extLst>
-                </a:gridCol>
-              </a:tblGrid>
-              <a:tr h="370840">
-                <a:tc>
-                  <a:txBody>
-                    <a:bodyPr/>
-                    <a:lstStyle/>
-                    <a:p>
-                      <a:r>
-                        <a:rPr lang="en-US" sz="1000" dirty="0">
-                          <a:latin typeface="Courier New" panose="02070309020205020404" pitchFamily="49" charset="0"/>
-                          <a:cs typeface="Courier New" panose="02070309020205020404" pitchFamily="49" charset="0"/>
-                        </a:rPr>
-                        <a:t>{</a:t>
-                      </a:r>
-                    </a:p>
-                    <a:p>
-                      <a:r>
-                        <a:rPr lang="en-US" sz="1000" dirty="0">
-                          <a:latin typeface="Courier New" panose="02070309020205020404" pitchFamily="49" charset="0"/>
-                          <a:cs typeface="Courier New" panose="02070309020205020404" pitchFamily="49" charset="0"/>
-                        </a:rPr>
-                        <a:t>    "</a:t>
-                      </a:r>
-                      <a:r>
-                        <a:rPr lang="en-US" sz="1000" dirty="0" err="1">
-                          <a:latin typeface="Courier New" panose="02070309020205020404" pitchFamily="49" charset="0"/>
-                          <a:cs typeface="Courier New" panose="02070309020205020404" pitchFamily="49" charset="0"/>
-                        </a:rPr>
-                        <a:t>default_pod</a:t>
-                      </a:r>
-                      <a:r>
-                        <a:rPr lang="en-US" sz="1000" dirty="0">
-                          <a:latin typeface="Courier New" panose="02070309020205020404" pitchFamily="49" charset="0"/>
-                          <a:cs typeface="Courier New" panose="02070309020205020404" pitchFamily="49" charset="0"/>
-                        </a:rPr>
-                        <a:t>": "</a:t>
-                      </a:r>
-                      <a:r>
-                        <a:rPr lang="en-US" sz="1000" dirty="0" err="1">
-                          <a:latin typeface="Courier New" panose="02070309020205020404" pitchFamily="49" charset="0"/>
-                          <a:cs typeface="Courier New" panose="02070309020205020404" pitchFamily="49" charset="0"/>
-                        </a:rPr>
-                        <a:t>dmp</a:t>
-                      </a:r>
-                      <a:r>
-                        <a:rPr lang="en-US" sz="1000" dirty="0">
-                          <a:latin typeface="Courier New" panose="02070309020205020404" pitchFamily="49" charset="0"/>
-                          <a:cs typeface="Courier New" panose="02070309020205020404" pitchFamily="49" charset="0"/>
-                        </a:rPr>
-                        <a:t>-us",</a:t>
-                      </a:r>
-                    </a:p>
-                    <a:p>
-                      <a:r>
-                        <a:rPr lang="en-US" sz="1000" dirty="0">
-                          <a:latin typeface="Courier New" panose="02070309020205020404" pitchFamily="49" charset="0"/>
-                          <a:cs typeface="Courier New" panose="02070309020205020404" pitchFamily="49" charset="0"/>
-                        </a:rPr>
-                        <a:t>    "</a:t>
-                      </a:r>
-                      <a:r>
-                        <a:rPr lang="en-US" sz="1000" dirty="0" err="1">
-                          <a:latin typeface="Courier New" panose="02070309020205020404" pitchFamily="49" charset="0"/>
-                          <a:cs typeface="Courier New" panose="02070309020205020404" pitchFamily="49" charset="0"/>
-                        </a:rPr>
-                        <a:t>default_user</a:t>
-                      </a:r>
-                      <a:r>
-                        <a:rPr lang="en-US" sz="1000" dirty="0">
-                          <a:latin typeface="Courier New" panose="02070309020205020404" pitchFamily="49" charset="0"/>
-                          <a:cs typeface="Courier New" panose="02070309020205020404" pitchFamily="49" charset="0"/>
-                        </a:rPr>
-                        <a:t>": "</a:t>
-                      </a:r>
-                      <a:r>
-                        <a:rPr lang="en-US" sz="1000" dirty="0" err="1">
-                          <a:latin typeface="Courier New" panose="02070309020205020404" pitchFamily="49" charset="0"/>
-                          <a:cs typeface="Courier New" panose="02070309020205020404" pitchFamily="49" charset="0"/>
-                        </a:rPr>
-                        <a:t>shayes_compass</a:t>
-                      </a:r>
-                      <a:r>
-                        <a:rPr lang="en-US" sz="1000" dirty="0">
-                          <a:latin typeface="Courier New" panose="02070309020205020404" pitchFamily="49" charset="0"/>
-                          <a:cs typeface="Courier New" panose="02070309020205020404" pitchFamily="49" charset="0"/>
-                        </a:rPr>
-                        <a:t>",</a:t>
-                      </a:r>
-                    </a:p>
-                    <a:p>
-                      <a:r>
-                        <a:rPr lang="en-US" sz="1000" dirty="0">
-                          <a:latin typeface="Courier New" panose="02070309020205020404" pitchFamily="49" charset="0"/>
-                          <a:cs typeface="Courier New" panose="02070309020205020404" pitchFamily="49" charset="0"/>
-                        </a:rPr>
-                        <a:t>    "</a:t>
-                      </a:r>
-                      <a:r>
-                        <a:rPr lang="en-US" sz="1000" dirty="0" err="1">
-                          <a:latin typeface="Courier New" panose="02070309020205020404" pitchFamily="49" charset="0"/>
-                          <a:cs typeface="Courier New" panose="02070309020205020404" pitchFamily="49" charset="0"/>
-                        </a:rPr>
-                        <a:t>default_pwd</a:t>
-                      </a:r>
-                      <a:r>
-                        <a:rPr lang="en-US" sz="1000" dirty="0">
-                          <a:latin typeface="Courier New" panose="02070309020205020404" pitchFamily="49" charset="0"/>
-                          <a:cs typeface="Courier New" panose="02070309020205020404" pitchFamily="49" charset="0"/>
-                        </a:rPr>
-                        <a:t>": “xxx"        </a:t>
-                      </a:r>
-                    </a:p>
-                    <a:p>
-                      <a:r>
-                        <a:rPr lang="en-US" sz="1000" dirty="0">
-                          <a:latin typeface="Courier New" panose="02070309020205020404" pitchFamily="49" charset="0"/>
-                          <a:cs typeface="Courier New" panose="02070309020205020404" pitchFamily="49" charset="0"/>
-                        </a:rPr>
-                        <a:t>}</a:t>
-                      </a:r>
-                    </a:p>
-                  </a:txBody>
-                  <a:tcPr>
-                    <a:solidFill>
-                      <a:schemeClr val="tx1"/>
-                    </a:solidFill>
-                  </a:tcPr>
-                </a:tc>
-                <a:extLst>
-                  <a:ext uri="{0D108BD9-81ED-4DB2-BD59-A6C34878D82A}">
-                    <a16:rowId xmlns:a16="http://schemas.microsoft.com/office/drawing/2014/main" val="3942343172"/>
-                  </a:ext>
-                </a:extLst>
-              </a:tr>
-            </a:tbl>
-          </a:graphicData>
-        </a:graphic>
-      </p:graphicFrame>
-      <p:graphicFrame>
-        <p:nvGraphicFramePr>
-          <p:cNvPr id="3" name="Table 2">
-            <a:extLst>
-              <a:ext uri="{FF2B5EF4-FFF2-40B4-BE49-F238E27FC236}">
-                <a16:creationId xmlns:a16="http://schemas.microsoft.com/office/drawing/2014/main" id="{BE90F69A-EA45-AE9D-6606-2A88FC566B3B}"/>
-              </a:ext>
-            </a:extLst>
-          </p:cNvPr>
-          <p:cNvGraphicFramePr>
-            <a:graphicFrameLocks noGrp="1"/>
-          </p:cNvGraphicFramePr>
-          <p:nvPr>
-            <p:extLst>
-              <p:ext uri="{D42A27DB-BD31-4B8C-83A1-F6EECF244321}">
-                <p14:modId xmlns:p14="http://schemas.microsoft.com/office/powerpoint/2010/main" val="1368618603"/>
-              </p:ext>
-            </p:extLst>
-          </p:nvPr>
-        </p:nvGraphicFramePr>
-        <p:xfrm>
-          <a:off x="3176962" y="1247772"/>
-          <a:ext cx="4340020" cy="261409"/>
-        </p:xfrm>
-        <a:graphic>
-          <a:graphicData uri="http://schemas.openxmlformats.org/drawingml/2006/table">
-            <a:tbl>
-              <a:tblPr firstRow="1" bandRow="1">
-                <a:tableStyleId>{5C22544A-7EE6-4342-B048-85BDC9FD1C3A}</a:tableStyleId>
-              </a:tblPr>
-              <a:tblGrid>
-                <a:gridCol w="4340020">
-                  <a:extLst>
-                    <a:ext uri="{9D8B030D-6E8A-4147-A177-3AD203B41FA5}">
-                      <a16:colId xmlns:a16="http://schemas.microsoft.com/office/drawing/2014/main" val="2725794101"/>
-                    </a:ext>
-                  </a:extLst>
-                </a:gridCol>
-              </a:tblGrid>
-              <a:tr h="261409">
-                <a:tc>
-                  <a:txBody>
-                    <a:bodyPr/>
-                    <a:lstStyle/>
-                    <a:p>
-                      <a:r>
-                        <a:rPr lang="en-US" sz="1000" dirty="0">
-                          <a:latin typeface="Courier New" panose="02070309020205020404" pitchFamily="49" charset="0"/>
-                          <a:cs typeface="Courier New" panose="02070309020205020404" pitchFamily="49" charset="0"/>
-                        </a:rPr>
-                        <a:t>python update_datasets.py my_config.csv</a:t>
-                      </a:r>
-                    </a:p>
-                  </a:txBody>
-                  <a:tcPr>
-                    <a:solidFill>
-                      <a:schemeClr val="tx1"/>
-                    </a:solidFill>
-                  </a:tcPr>
-                </a:tc>
-                <a:extLst>
-                  <a:ext uri="{0D108BD9-81ED-4DB2-BD59-A6C34878D82A}">
-                    <a16:rowId xmlns:a16="http://schemas.microsoft.com/office/drawing/2014/main" val="3942343172"/>
-                  </a:ext>
-                </a:extLst>
-              </a:tr>
-            </a:tbl>
-          </a:graphicData>
-        </a:graphic>
-      </p:graphicFrame>
-    </p:spTree>
-    <p:extLst>
-      <p:ext uri="{BB962C8B-B14F-4D97-AF65-F5344CB8AC3E}">
-        <p14:creationId xmlns:p14="http://schemas.microsoft.com/office/powerpoint/2010/main" val="1185346069"/>
-      </p:ext>
-    </p:extLst>
-  </p:cSld>
-  <p:clrMapOvr>
-    <a:masterClrMapping/>
-  </p:clrMapOvr>
-  <mc:AlternateContent xmlns:mc="http://schemas.openxmlformats.org/markup-compatibility/2006" xmlns:p14="http://schemas.microsoft.com/office/powerpoint/2010/main">
-    <mc:Choice Requires="p14">
-      <p:transition spd="med" p14:dur="700" advClick="0">
-        <p:fade/>
-      </p:transition>
-    </mc:Choice>
-    <mc:Fallback xmlns="">
-      <p:transition spd="med" advClick="0">
-        <p:fade/>
-      </p:transition>
-    </mc:Fallback>
-  </mc:AlternateContent>
-</p:sld>
-</file>
-
-<file path=ppt/slides/slide6.xml><?xml version="1.0" encoding="utf-8"?>
-<p:sld xmlns:a="http://schemas.openxmlformats.org/drawingml/2006/main" xmlns:r="http://schemas.openxmlformats.org/officeDocument/2006/relationships" xmlns:p="http://schemas.openxmlformats.org/presentationml/2006/main">
-  <p:cSld>
-    <p:spTree>
-      <p:nvGrpSpPr>
-        <p:cNvPr id="1" name=""/>
-        <p:cNvGrpSpPr/>
-        <p:nvPr/>
-      </p:nvGrpSpPr>
-      <p:grpSpPr>
-        <a:xfrm>
-          <a:off x="0" y="0"/>
-          <a:ext cx="0" cy="0"/>
-          <a:chOff x="0" y="0"/>
-          <a:chExt cx="0" cy="0"/>
-        </a:xfrm>
-      </p:grpSpPr>
-      <p:sp>
-        <p:nvSpPr>
-          <p:cNvPr id="5" name="Title 4">
-            <a:extLst>
-              <a:ext uri="{FF2B5EF4-FFF2-40B4-BE49-F238E27FC236}">
-                <a16:creationId xmlns:a16="http://schemas.microsoft.com/office/drawing/2014/main" id="{C2B479B7-4E1E-475F-B459-5CE8B05302D3}"/>
-              </a:ext>
-            </a:extLst>
-          </p:cNvPr>
-          <p:cNvSpPr>
-            <a:spLocks noGrp="1"/>
-          </p:cNvSpPr>
-          <p:nvPr>
-            <p:ph type="title"/>
-          </p:nvPr>
-        </p:nvSpPr>
-        <p:spPr/>
-        <p:txBody>
-          <a:bodyPr/>
-          <a:lstStyle/>
-          <a:p>
-            <a:r>
-              <a:rPr lang="en-US" dirty="0"/>
-              <a:t>Output</a:t>
-            </a:r>
-            <a:endParaRPr lang="en-IN" dirty="0"/>
-          </a:p>
-        </p:txBody>
-      </p:sp>
-      <p:sp>
-        <p:nvSpPr>
-          <p:cNvPr id="16" name="Content Placeholder 13">
-            <a:extLst>
-              <a:ext uri="{FF2B5EF4-FFF2-40B4-BE49-F238E27FC236}">
-                <a16:creationId xmlns:a16="http://schemas.microsoft.com/office/drawing/2014/main" id="{807EB0DB-72EF-4CAE-8A2F-F7E55C093081}"/>
-              </a:ext>
-            </a:extLst>
-          </p:cNvPr>
-          <p:cNvSpPr txBox="1">
-            <a:spLocks/>
-          </p:cNvSpPr>
-          <p:nvPr/>
-        </p:nvSpPr>
-        <p:spPr>
-          <a:xfrm>
-            <a:off x="1180247" y="1610532"/>
-            <a:ext cx="3180631" cy="2562457"/>
-          </a:xfrm>
-          <a:prstGeom prst="rect">
-            <a:avLst/>
-          </a:prstGeom>
-        </p:spPr>
-        <p:txBody>
-          <a:bodyPr vert="horz" lIns="0" tIns="0" rIns="0" bIns="0" rtlCol="0">
-            <a:noAutofit/>
-          </a:bodyPr>
-          <a:lstStyle>
-            <a:lvl1pPr marL="173038" indent="-173038" algn="l" defTabSz="914217" rtl="0" eaLnBrk="1" latinLnBrk="0" hangingPunct="1">
-              <a:lnSpc>
-                <a:spcPct val="90000"/>
-              </a:lnSpc>
-              <a:spcBef>
-                <a:spcPts val="400"/>
-              </a:spcBef>
-              <a:spcAft>
-                <a:spcPts val="1200"/>
-              </a:spcAft>
-              <a:buClr>
-                <a:schemeClr val="accent2"/>
-              </a:buClr>
-              <a:buFont typeface="Arial" panose="020B0604020202020204" pitchFamily="34" charset="0"/>
-              <a:buChar char="•"/>
-              <a:defRPr sz="2100" b="0" i="0" kern="1200" baseline="0">
-                <a:solidFill>
-                  <a:schemeClr val="tx1"/>
-                </a:solidFill>
-                <a:latin typeface="Roboto" charset="0"/>
-                <a:ea typeface="Roboto" charset="0"/>
-                <a:cs typeface="Roboto" charset="0"/>
-              </a:defRPr>
-            </a:lvl1pPr>
-            <a:lvl2pPr marL="344488" indent="-174625" algn="l" defTabSz="914217" rtl="0" eaLnBrk="1" latinLnBrk="0" hangingPunct="1">
-              <a:lnSpc>
-                <a:spcPct val="90000"/>
-              </a:lnSpc>
-              <a:spcBef>
-                <a:spcPts val="0"/>
-              </a:spcBef>
-              <a:spcAft>
-                <a:spcPts val="1200"/>
-              </a:spcAft>
-              <a:buClr>
-                <a:schemeClr val="accent2"/>
-              </a:buClr>
-              <a:buFont typeface="Arial" panose="020B0604020202020204" pitchFamily="34" charset="0"/>
-              <a:buChar char="•"/>
-              <a:defRPr sz="1800" b="0" i="0" kern="1200" baseline="0">
-                <a:solidFill>
-                  <a:schemeClr val="tx1"/>
-                </a:solidFill>
-                <a:latin typeface="Roboto" charset="0"/>
-                <a:ea typeface="Roboto" charset="0"/>
-                <a:cs typeface="Roboto" charset="0"/>
-              </a:defRPr>
-            </a:lvl2pPr>
-            <a:lvl3pPr marL="514350" indent="-169863" algn="l" defTabSz="914217" rtl="0" eaLnBrk="1" latinLnBrk="0" hangingPunct="1">
-              <a:lnSpc>
-                <a:spcPct val="90000"/>
-              </a:lnSpc>
-              <a:spcBef>
-                <a:spcPts val="0"/>
-              </a:spcBef>
-              <a:spcAft>
-                <a:spcPts val="1200"/>
-              </a:spcAft>
-              <a:buClr>
-                <a:schemeClr val="accent2"/>
-              </a:buClr>
-              <a:buFont typeface="Arial" panose="020B0604020202020204" pitchFamily="34" charset="0"/>
-              <a:buChar char="•"/>
-              <a:defRPr sz="1600" b="0" i="0" kern="1200">
-                <a:solidFill>
-                  <a:schemeClr val="tx1"/>
-                </a:solidFill>
-                <a:latin typeface="Roboto" charset="0"/>
-                <a:ea typeface="Roboto" charset="0"/>
-                <a:cs typeface="Roboto" charset="0"/>
-              </a:defRPr>
-            </a:lvl3pPr>
-            <a:lvl4pPr marL="630238" indent="-171450" algn="l" defTabSz="914217" rtl="0" eaLnBrk="1" latinLnBrk="0" hangingPunct="1">
-              <a:lnSpc>
-                <a:spcPct val="90000"/>
-              </a:lnSpc>
-              <a:spcBef>
-                <a:spcPts val="0"/>
-              </a:spcBef>
-              <a:spcAft>
-                <a:spcPts val="1200"/>
-              </a:spcAft>
-              <a:buClr>
-                <a:schemeClr val="accent2"/>
-              </a:buClr>
-              <a:buFont typeface="Arial" panose="020B0604020202020204" pitchFamily="34" charset="0"/>
-              <a:buChar char="•"/>
-              <a:defRPr sz="1400" b="0" i="0" kern="1200">
-                <a:solidFill>
-                  <a:schemeClr val="tx1"/>
-                </a:solidFill>
-                <a:latin typeface="Roboto" charset="0"/>
-                <a:ea typeface="Roboto" charset="0"/>
-                <a:cs typeface="Roboto" charset="0"/>
-              </a:defRPr>
-            </a:lvl4pPr>
-            <a:lvl5pPr marL="800100" indent="-169863" algn="l" defTabSz="914217" rtl="0" eaLnBrk="1" latinLnBrk="0" hangingPunct="1">
-              <a:lnSpc>
-                <a:spcPct val="90000"/>
-              </a:lnSpc>
-              <a:spcBef>
-                <a:spcPts val="0"/>
-              </a:spcBef>
-              <a:spcAft>
-                <a:spcPts val="1200"/>
-              </a:spcAft>
-              <a:buClr>
-                <a:schemeClr val="accent2"/>
-              </a:buClr>
-              <a:buFont typeface="Arial" panose="020B0604020202020204" pitchFamily="34" charset="0"/>
-              <a:buChar char="•"/>
-              <a:defRPr sz="1400" b="0" i="0" kern="1200">
-                <a:solidFill>
-                  <a:schemeClr val="tx1"/>
-                </a:solidFill>
-                <a:latin typeface="Roboto" charset="0"/>
-                <a:ea typeface="Roboto" charset="0"/>
-                <a:cs typeface="Roboto" charset="0"/>
-              </a:defRPr>
-            </a:lvl5pPr>
-            <a:lvl6pPr marL="914400" indent="-169863" algn="l" defTabSz="914217" rtl="0" eaLnBrk="1" latinLnBrk="0" hangingPunct="1">
-              <a:lnSpc>
-                <a:spcPct val="90000"/>
-              </a:lnSpc>
-              <a:spcBef>
-                <a:spcPts val="500"/>
-              </a:spcBef>
-              <a:spcAft>
-                <a:spcPts val="1200"/>
-              </a:spcAft>
-              <a:buClr>
-                <a:schemeClr val="accent2"/>
-              </a:buClr>
-              <a:buFont typeface="Arial" panose="020B0604020202020204" pitchFamily="34" charset="0"/>
-              <a:buChar char="•"/>
-              <a:defRPr sz="1200" b="0" i="0" kern="1200">
-                <a:solidFill>
-                  <a:schemeClr val="tx1"/>
-                </a:solidFill>
-                <a:latin typeface="Roboto" charset="0"/>
-                <a:ea typeface="Roboto" charset="0"/>
-                <a:cs typeface="Roboto" charset="0"/>
-              </a:defRPr>
-            </a:lvl6pPr>
-            <a:lvl7pPr marL="1084263" indent="-169863" algn="l" defTabSz="914217" rtl="0" eaLnBrk="1" latinLnBrk="0" hangingPunct="1">
-              <a:lnSpc>
-                <a:spcPct val="90000"/>
-              </a:lnSpc>
-              <a:spcBef>
-                <a:spcPts val="500"/>
-              </a:spcBef>
-              <a:spcAft>
-                <a:spcPts val="1200"/>
-              </a:spcAft>
-              <a:buClr>
-                <a:schemeClr val="accent2"/>
-              </a:buClr>
-              <a:buFont typeface="Arial" panose="020B0604020202020204" pitchFamily="34" charset="0"/>
-              <a:buChar char="•"/>
-              <a:defRPr sz="1200" b="0" i="0" kern="1200">
-                <a:solidFill>
-                  <a:schemeClr val="tx1"/>
-                </a:solidFill>
-                <a:latin typeface="Roboto" charset="0"/>
-                <a:ea typeface="Roboto" charset="0"/>
-                <a:cs typeface="Roboto" charset="0"/>
-              </a:defRPr>
-            </a:lvl7pPr>
-            <a:lvl8pPr marL="1258888" indent="-174625" algn="l" defTabSz="914217" rtl="0" eaLnBrk="1" latinLnBrk="0" hangingPunct="1">
-              <a:lnSpc>
-                <a:spcPct val="90000"/>
-              </a:lnSpc>
-              <a:spcBef>
-                <a:spcPts val="500"/>
-              </a:spcBef>
-              <a:spcAft>
-                <a:spcPts val="1200"/>
-              </a:spcAft>
-              <a:buClr>
-                <a:schemeClr val="accent2"/>
-              </a:buClr>
-              <a:buFont typeface="Arial" panose="020B0604020202020204" pitchFamily="34" charset="0"/>
-              <a:buChar char="•"/>
-              <a:defRPr sz="1200" b="0" i="0" kern="1200">
-                <a:solidFill>
-                  <a:schemeClr val="tx1"/>
-                </a:solidFill>
-                <a:latin typeface="Roboto" charset="0"/>
-                <a:ea typeface="Roboto" charset="0"/>
-                <a:cs typeface="Roboto" charset="0"/>
-              </a:defRPr>
-            </a:lvl8pPr>
-            <a:lvl9pPr marL="1428750" indent="-169863" algn="l" defTabSz="914217" rtl="0" eaLnBrk="1" latinLnBrk="0" hangingPunct="1">
-              <a:lnSpc>
-                <a:spcPct val="90000"/>
-              </a:lnSpc>
-              <a:spcBef>
-                <a:spcPts val="500"/>
-              </a:spcBef>
-              <a:spcAft>
-                <a:spcPts val="1200"/>
-              </a:spcAft>
-              <a:buClr>
-                <a:schemeClr val="accent2"/>
-              </a:buClr>
-              <a:buFont typeface="Arial" panose="020B0604020202020204" pitchFamily="34" charset="0"/>
-              <a:buChar char="•"/>
-              <a:defRPr sz="1200" b="0" i="0" kern="1200">
-                <a:solidFill>
-                  <a:schemeClr val="tx1"/>
-                </a:solidFill>
-                <a:latin typeface="Roboto" charset="0"/>
-                <a:ea typeface="Roboto" charset="0"/>
-                <a:cs typeface="Roboto" charset="0"/>
-              </a:defRPr>
-            </a:lvl9pPr>
-          </a:lstStyle>
-          <a:p>
-            <a:pPr marL="0" indent="0">
-              <a:buNone/>
-            </a:pPr>
-            <a:endParaRPr lang="en-IN" sz="1600" dirty="0"/>
-          </a:p>
-        </p:txBody>
-      </p:sp>
-      <p:sp>
-        <p:nvSpPr>
-          <p:cNvPr id="6" name="TextBox 5">
-            <a:extLst>
-              <a:ext uri="{FF2B5EF4-FFF2-40B4-BE49-F238E27FC236}">
-                <a16:creationId xmlns:a16="http://schemas.microsoft.com/office/drawing/2014/main" id="{9F8FFC18-4FD7-5E97-CCB3-5E13CE612AEB}"/>
-              </a:ext>
-            </a:extLst>
-          </p:cNvPr>
-          <p:cNvSpPr txBox="1"/>
-          <p:nvPr/>
-        </p:nvSpPr>
-        <p:spPr>
-          <a:xfrm>
             <a:off x="848968" y="1157381"/>
             <a:ext cx="10490887" cy="1084519"/>
           </a:xfrm>
@@ -25993,14 +25482,14 @@
           <p:nvPr>
             <p:extLst>
               <p:ext uri="{D42A27DB-BD31-4B8C-83A1-F6EECF244321}">
-                <p14:modId xmlns:p14="http://schemas.microsoft.com/office/powerpoint/2010/main" val="1054570147"/>
+                <p14:modId xmlns:p14="http://schemas.microsoft.com/office/powerpoint/2010/main" val="2602002768"/>
               </p:ext>
             </p:extLst>
           </p:nvPr>
         </p:nvGraphicFramePr>
         <p:xfrm>
-          <a:off x="218899" y="2134163"/>
-          <a:ext cx="11458752" cy="3749040"/>
+          <a:off x="350686" y="1972117"/>
+          <a:ext cx="11458752" cy="4236720"/>
         </p:xfrm>
         <a:graphic>
           <a:graphicData uri="http://schemas.openxmlformats.org/drawingml/2006/table">
@@ -26024,16 +25513,136 @@
                     <a:lstStyle/>
                     <a:p>
                       <a:r>
-                        <a:rPr lang="en-US" sz="1000" dirty="0">
+                        <a:rPr lang="en-US" sz="800" dirty="0">
                           <a:latin typeface="Courier New" panose="02070309020205020404" pitchFamily="49" charset="0"/>
                           <a:cs typeface="Courier New" panose="02070309020205020404" pitchFamily="49" charset="0"/>
                         </a:rPr>
-                        <a:t>&gt; python update_datasets.py</a:t>
+                        <a:t>INFO: </a:t>
+                      </a:r>
+                      <a:r>
+                        <a:rPr lang="en-US" sz="800" dirty="0" err="1">
+                          <a:latin typeface="Courier New" panose="02070309020205020404" pitchFamily="49" charset="0"/>
+                          <a:cs typeface="Courier New" panose="02070309020205020404" pitchFamily="49" charset="0"/>
+                        </a:rPr>
+                        <a:t>update_dataset</a:t>
+                      </a:r>
+                      <a:r>
+                        <a:rPr lang="en-US" sz="800" dirty="0">
+                          <a:latin typeface="Courier New" panose="02070309020205020404" pitchFamily="49" charset="0"/>
+                          <a:cs typeface="Courier New" panose="02070309020205020404" pitchFamily="49" charset="0"/>
+                        </a:rPr>
+                        <a:t> 20241202</a:t>
                       </a:r>
                     </a:p>
                     <a:p>
                       <a:r>
-                        <a:rPr lang="en-US" sz="1000" dirty="0">
+                        <a:rPr lang="en-US" sz="800" dirty="0">
+                          <a:latin typeface="Courier New" panose="02070309020205020404" pitchFamily="49" charset="0"/>
+                          <a:cs typeface="Courier New" panose="02070309020205020404" pitchFamily="49" charset="0"/>
+                        </a:rPr>
+                        <a:t>Select a CSV file:</a:t>
+                      </a:r>
+                    </a:p>
+                    <a:p>
+                      <a:r>
+                        <a:rPr lang="en-US" sz="800" dirty="0">
+                          <a:latin typeface="Courier New" panose="02070309020205020404" pitchFamily="49" charset="0"/>
+                          <a:cs typeface="Courier New" panose="02070309020205020404" pitchFamily="49" charset="0"/>
+                        </a:rPr>
+                        <a:t>    1. config_test.csv</a:t>
+                      </a:r>
+                    </a:p>
+                    <a:p>
+                      <a:r>
+                        <a:rPr lang="en-US" sz="800" dirty="0">
+                          <a:latin typeface="Courier New" panose="02070309020205020404" pitchFamily="49" charset="0"/>
+                          <a:cs typeface="Courier New" panose="02070309020205020404" pitchFamily="49" charset="0"/>
+                        </a:rPr>
+                        <a:t>Enter the number of the file to select (1-1): 1</a:t>
+                      </a:r>
+                    </a:p>
+                    <a:p>
+                      <a:r>
+                        <a:rPr lang="en-US" sz="800" dirty="0">
+                          <a:latin typeface="Courier New" panose="02070309020205020404" pitchFamily="49" charset="0"/>
+                          <a:cs typeface="Courier New" panose="02070309020205020404" pitchFamily="49" charset="0"/>
+                        </a:rPr>
+                        <a:t>INFO: No 'default' profile found. Please select a profile:</a:t>
+                      </a:r>
+                    </a:p>
+                    <a:p>
+                      <a:r>
+                        <a:rPr lang="en-US" sz="800" dirty="0">
+                          <a:latin typeface="Courier New" panose="02070309020205020404" pitchFamily="49" charset="0"/>
+                          <a:cs typeface="Courier New" panose="02070309020205020404" pitchFamily="49" charset="0"/>
+                        </a:rPr>
+                        <a:t>    1. Testing</a:t>
+                      </a:r>
+                    </a:p>
+                    <a:p>
+                      <a:r>
+                        <a:rPr lang="en-US" sz="800" dirty="0">
+                          <a:latin typeface="Courier New" panose="02070309020205020404" pitchFamily="49" charset="0"/>
+                          <a:cs typeface="Courier New" panose="02070309020205020404" pitchFamily="49" charset="0"/>
+                        </a:rPr>
+                        <a:t>    2. </a:t>
+                      </a:r>
+                      <a:r>
+                        <a:rPr lang="en-US" sz="800" dirty="0" err="1">
+                          <a:latin typeface="Courier New" panose="02070309020205020404" pitchFamily="49" charset="0"/>
+                          <a:cs typeface="Courier New" panose="02070309020205020404" pitchFamily="49" charset="0"/>
+                        </a:rPr>
+                        <a:t>shayes_compass</a:t>
+                      </a:r>
+                      <a:endParaRPr lang="en-US" sz="800" dirty="0">
+                        <a:latin typeface="Courier New" panose="02070309020205020404" pitchFamily="49" charset="0"/>
+                        <a:cs typeface="Courier New" panose="02070309020205020404" pitchFamily="49" charset="0"/>
+                      </a:endParaRPr>
+                    </a:p>
+                    <a:p>
+                      <a:r>
+                        <a:rPr lang="en-US" sz="800" dirty="0">
+                          <a:latin typeface="Courier New" panose="02070309020205020404" pitchFamily="49" charset="0"/>
+                          <a:cs typeface="Courier New" panose="02070309020205020404" pitchFamily="49" charset="0"/>
+                        </a:rPr>
+                        <a:t>    3. reinvent</a:t>
+                      </a:r>
+                    </a:p>
+                    <a:p>
+                      <a:r>
+                        <a:rPr lang="en-US" sz="800" dirty="0">
+                          <a:latin typeface="Courier New" panose="02070309020205020404" pitchFamily="49" charset="0"/>
+                          <a:cs typeface="Courier New" panose="02070309020205020404" pitchFamily="49" charset="0"/>
+                        </a:rPr>
+                        <a:t>Enter the number of the profile to use: 2</a:t>
+                      </a:r>
+                    </a:p>
+                    <a:p>
+                      <a:r>
+                        <a:rPr lang="en-US" sz="800" dirty="0">
+                          <a:latin typeface="Courier New" panose="02070309020205020404" pitchFamily="49" charset="0"/>
+                          <a:cs typeface="Courier New" panose="02070309020205020404" pitchFamily="49" charset="0"/>
+                        </a:rPr>
+                        <a:t>Using credentials from the '</a:t>
+                      </a:r>
+                      <a:r>
+                        <a:rPr lang="en-US" sz="800" dirty="0" err="1">
+                          <a:latin typeface="Courier New" panose="02070309020205020404" pitchFamily="49" charset="0"/>
+                          <a:cs typeface="Courier New" panose="02070309020205020404" pitchFamily="49" charset="0"/>
+                        </a:rPr>
+                        <a:t>shayes_compass</a:t>
+                      </a:r>
+                      <a:r>
+                        <a:rPr lang="en-US" sz="800" dirty="0">
+                          <a:latin typeface="Courier New" panose="02070309020205020404" pitchFamily="49" charset="0"/>
+                          <a:cs typeface="Courier New" panose="02070309020205020404" pitchFamily="49" charset="0"/>
+                        </a:rPr>
+                        <a:t>' profile.</a:t>
+                      </a:r>
+                    </a:p>
+                    <a:p>
+                      <a:r>
+                        <a:rPr lang="en-US" sz="800" dirty="0">
                           <a:latin typeface="Courier New" panose="02070309020205020404" pitchFamily="49" charset="0"/>
                           <a:cs typeface="Courier New" panose="02070309020205020404" pitchFamily="49" charset="0"/>
                         </a:rPr>
@@ -26042,7 +25651,7 @@
                     </a:p>
                     <a:p>
                       <a:r>
-                        <a:rPr lang="en-US" sz="1000" dirty="0">
+                        <a:rPr lang="en-US" sz="800" dirty="0">
                           <a:latin typeface="Courier New" panose="02070309020205020404" pitchFamily="49" charset="0"/>
                           <a:cs typeface="Courier New" panose="02070309020205020404" pitchFamily="49" charset="0"/>
                         </a:rPr>
@@ -26051,21 +25660,21 @@
                     </a:p>
                     <a:p>
                       <a:r>
-                        <a:rPr lang="en-US" sz="1000" dirty="0">
+                        <a:rPr lang="en-US" sz="800" dirty="0">
                           <a:latin typeface="Courier New" panose="02070309020205020404" pitchFamily="49" charset="0"/>
                           <a:cs typeface="Courier New" panose="02070309020205020404" pitchFamily="49" charset="0"/>
                         </a:rPr>
                         <a:t>Enter pod (default: </a:t>
                       </a:r>
                       <a:r>
-                        <a:rPr lang="en-US" sz="1000" dirty="0" err="1">
+                        <a:rPr lang="en-US" sz="800" dirty="0" err="1">
                           <a:latin typeface="Courier New" panose="02070309020205020404" pitchFamily="49" charset="0"/>
                           <a:cs typeface="Courier New" panose="02070309020205020404" pitchFamily="49" charset="0"/>
                         </a:rPr>
                         <a:t>dmp</a:t>
                       </a:r>
                       <a:r>
-                        <a:rPr lang="en-US" sz="1000" dirty="0">
+                        <a:rPr lang="en-US" sz="800" dirty="0">
                           <a:latin typeface="Courier New" panose="02070309020205020404" pitchFamily="49" charset="0"/>
                           <a:cs typeface="Courier New" panose="02070309020205020404" pitchFamily="49" charset="0"/>
                         </a:rPr>
@@ -26074,39 +25683,39 @@
                     </a:p>
                     <a:p>
                       <a:r>
-                        <a:rPr lang="en-US" sz="1000" dirty="0">
+                        <a:rPr lang="en-US" sz="800" dirty="0">
                           <a:latin typeface="Courier New" panose="02070309020205020404" pitchFamily="49" charset="0"/>
                           <a:cs typeface="Courier New" panose="02070309020205020404" pitchFamily="49" charset="0"/>
                         </a:rPr>
                         <a:t>Enter username (default : </a:t>
                       </a:r>
                       <a:r>
-                        <a:rPr lang="en-US" sz="1000" dirty="0" err="1">
+                        <a:rPr lang="en-US" sz="800" dirty="0" err="1">
                           <a:latin typeface="Courier New" panose="02070309020205020404" pitchFamily="49" charset="0"/>
                           <a:cs typeface="Courier New" panose="02070309020205020404" pitchFamily="49" charset="0"/>
                         </a:rPr>
                         <a:t>shayes_compass</a:t>
                       </a:r>
                       <a:r>
-                        <a:rPr lang="en-US" sz="1000" dirty="0">
+                        <a:rPr lang="en-US" sz="800" dirty="0">
                           <a:latin typeface="Courier New" panose="02070309020205020404" pitchFamily="49" charset="0"/>
                           <a:cs typeface="Courier New" panose="02070309020205020404" pitchFamily="49" charset="0"/>
                         </a:rPr>
-                        <a:t>): </a:t>
+                        <a:t>):</a:t>
                       </a:r>
                     </a:p>
                     <a:p>
                       <a:r>
-                        <a:rPr lang="en-US" sz="1000" dirty="0">
+                        <a:rPr lang="en-US" sz="800" dirty="0">
                           <a:latin typeface="Courier New" panose="02070309020205020404" pitchFamily="49" charset="0"/>
                           <a:cs typeface="Courier New" panose="02070309020205020404" pitchFamily="49" charset="0"/>
                         </a:rPr>
-                        <a:t>Enter password: </a:t>
+                        <a:t>Enter password:</a:t>
                       </a:r>
                     </a:p>
                     <a:p>
                       <a:r>
-                        <a:rPr lang="en-US" sz="1000" dirty="0">
+                        <a:rPr lang="en-US" sz="800" dirty="0">
                           <a:latin typeface="Courier New" panose="02070309020205020404" pitchFamily="49" charset="0"/>
                           <a:cs typeface="Courier New" panose="02070309020205020404" pitchFamily="49" charset="0"/>
                         </a:rPr>
@@ -26115,75 +25724,89 @@
                     </a:p>
                     <a:p>
                       <a:r>
-                        <a:rPr lang="en-US" sz="1000" dirty="0">
+                        <a:rPr lang="en-US" sz="800" dirty="0">
                           <a:latin typeface="Courier New" panose="02070309020205020404" pitchFamily="49" charset="0"/>
                           <a:cs typeface="Courier New" panose="02070309020205020404" pitchFamily="49" charset="0"/>
                         </a:rPr>
                         <a:t>INFO: Looking at appropriate elements in: NSEN Retail Rewards/</a:t>
                       </a:r>
                       <a:r>
-                        <a:rPr lang="en-US" sz="1000" dirty="0" err="1">
+                        <a:rPr lang="en-US" sz="800" dirty="0" err="1">
                           <a:latin typeface="Courier New" panose="02070309020205020404" pitchFamily="49" charset="0"/>
                           <a:cs typeface="Courier New" panose="02070309020205020404" pitchFamily="49" charset="0"/>
                         </a:rPr>
                         <a:t>orcl</a:t>
                       </a:r>
                       <a:r>
-                        <a:rPr lang="en-US" sz="1000" dirty="0">
+                        <a:rPr lang="en-US" sz="800" dirty="0">
                           <a:latin typeface="Courier New" panose="02070309020205020404" pitchFamily="49" charset="0"/>
                           <a:cs typeface="Courier New" panose="02070309020205020404" pitchFamily="49" charset="0"/>
                         </a:rPr>
-                        <a:t>/NSEN/NS_RWD_USER</a:t>
+                        <a:t>/NSEN/NS_RWD_PROD</a:t>
                       </a:r>
                     </a:p>
                     <a:p>
                       <a:r>
-                        <a:rPr lang="en-US" sz="1000" dirty="0">
+                        <a:rPr lang="en-US" sz="800" dirty="0">
                           <a:latin typeface="Courier New" panose="02070309020205020404" pitchFamily="49" charset="0"/>
                           <a:cs typeface="Courier New" panose="02070309020205020404" pitchFamily="49" charset="0"/>
                         </a:rPr>
-                        <a:t>INFO:  Queuing Insert Element in "NSEN User Data": RWD_CARD_EXP_DATE | Business Name: Credit Card Expiration | Terms: ['Credit Card Expiration']</a:t>
+                        <a:t>INFO: Looking at appropriate elements in: NSEN Retail Rewards/</a:t>
+                      </a:r>
+                      <a:r>
+                        <a:rPr lang="en-US" sz="800" dirty="0" err="1">
+                          <a:latin typeface="Courier New" panose="02070309020205020404" pitchFamily="49" charset="0"/>
+                          <a:cs typeface="Courier New" panose="02070309020205020404" pitchFamily="49" charset="0"/>
+                        </a:rPr>
+                        <a:t>orcl</a:t>
+                      </a:r>
+                      <a:r>
+                        <a:rPr lang="en-US" sz="800" dirty="0">
+                          <a:latin typeface="Courier New" panose="02070309020205020404" pitchFamily="49" charset="0"/>
+                          <a:cs typeface="Courier New" panose="02070309020205020404" pitchFamily="49" charset="0"/>
+                        </a:rPr>
+                        <a:t>/NSEN/NS_RWD_TRANS</a:t>
                       </a:r>
                     </a:p>
                     <a:p>
                       <a:r>
-                        <a:rPr lang="en-US" sz="1000" dirty="0">
+                        <a:rPr lang="en-US" sz="800" dirty="0">
                           <a:latin typeface="Courier New" panose="02070309020205020404" pitchFamily="49" charset="0"/>
                           <a:cs typeface="Courier New" panose="02070309020205020404" pitchFamily="49" charset="0"/>
                         </a:rPr>
-                        <a:t>INFO:  Queuing Insert Element in "NSEN User Data": RWD_USER_ID | Business Name: Account ID | Terms: ['Account ID']</a:t>
+                        <a:t>INFO:  Queuing Insert Element in "Test": RWD_POINTS | Business Name: Reward Points | Terms: ['Reward Points']</a:t>
                       </a:r>
                     </a:p>
                     <a:p>
                       <a:r>
-                        <a:rPr lang="en-US" sz="1000" dirty="0">
+                        <a:rPr lang="en-US" sz="800" dirty="0">
                           <a:latin typeface="Courier New" panose="02070309020205020404" pitchFamily="49" charset="0"/>
                           <a:cs typeface="Courier New" panose="02070309020205020404" pitchFamily="49" charset="0"/>
                         </a:rPr>
-                        <a:t>INFO:  Queuing Insert Element in "NSEN User Data": USER_NAME | Business Name: Username | Terms: ['Username']</a:t>
+                        <a:t>INFO:  Queuing Insert Element in "Test": PRODUCT_ID | Business Name: Product Identification | Terms: ['Product Identification']</a:t>
                       </a:r>
                     </a:p>
                     <a:p>
                       <a:r>
-                        <a:rPr lang="en-US" sz="1000" dirty="0">
+                        <a:rPr lang="en-US" sz="800" dirty="0">
                           <a:latin typeface="Courier New" panose="02070309020205020404" pitchFamily="49" charset="0"/>
                           <a:cs typeface="Courier New" panose="02070309020205020404" pitchFamily="49" charset="0"/>
                         </a:rPr>
-                        <a:t>INFO:  Queuing Insert Element in "NSEN User Data": RWD_BIRTH_DATE | Business Name: Date Of Birth | Terms: ['Date Of Birth']</a:t>
+                        <a:t>INFO:  Queuing Insert Element in "Test": RWD_TRANS_DATE | Business Name: Transaction Date | Terms: ['Transaction Date']</a:t>
                       </a:r>
                     </a:p>
                     <a:p>
                       <a:r>
-                        <a:rPr lang="en-US" sz="1000" dirty="0">
+                        <a:rPr lang="en-US" sz="800" dirty="0">
                           <a:latin typeface="Courier New" panose="02070309020205020404" pitchFamily="49" charset="0"/>
                           <a:cs typeface="Courier New" panose="02070309020205020404" pitchFamily="49" charset="0"/>
                         </a:rPr>
-                        <a:t>INFO:  Queuing Insert Element in "NSEN User Data": RWD_FIRST_NAME | Business Name: First Name | Terms: ['First Name']</a:t>
+                        <a:t>INFO: Queuing Lineage from "Test" to "Snowflake Marketing User Data"</a:t>
                       </a:r>
                     </a:p>
                     <a:p>
                       <a:r>
-                        <a:rPr lang="en-US" sz="1000" dirty="0">
+                        <a:rPr lang="en-US" sz="800" dirty="0">
                           <a:latin typeface="Courier New" panose="02070309020205020404" pitchFamily="49" charset="0"/>
                           <a:cs typeface="Courier New" panose="02070309020205020404" pitchFamily="49" charset="0"/>
                         </a:rPr>
@@ -26192,16 +25815,16 @@
                     </a:p>
                     <a:p>
                       <a:r>
-                        <a:rPr lang="en-US" sz="1000" dirty="0">
+                        <a:rPr lang="en-US" sz="800" dirty="0">
                           <a:latin typeface="Courier New" panose="02070309020205020404" pitchFamily="49" charset="0"/>
                           <a:cs typeface="Courier New" panose="02070309020205020404" pitchFamily="49" charset="0"/>
                         </a:rPr>
-                        <a:t>INFO: Publishing Element in "NSEN User Data": RWD_CARD_EXP_DATE</a:t>
+                        <a:t>INFO: Publishing Element in "Test": RWD_POINTS</a:t>
                       </a:r>
                     </a:p>
                     <a:p>
                       <a:r>
-                        <a:rPr lang="en-US" sz="1000" dirty="0">
+                        <a:rPr lang="en-US" sz="800" dirty="0">
                           <a:latin typeface="Courier New" panose="02070309020205020404" pitchFamily="49" charset="0"/>
                           <a:cs typeface="Courier New" panose="02070309020205020404" pitchFamily="49" charset="0"/>
                         </a:rPr>
@@ -26210,16 +25833,16 @@
                     </a:p>
                     <a:p>
                       <a:r>
-                        <a:rPr lang="en-US" sz="1000" dirty="0">
+                        <a:rPr lang="en-US" sz="800" dirty="0">
                           <a:latin typeface="Courier New" panose="02070309020205020404" pitchFamily="49" charset="0"/>
                           <a:cs typeface="Courier New" panose="02070309020205020404" pitchFamily="49" charset="0"/>
                         </a:rPr>
-                        <a:t>INFO: Publishing Element in "NSEN User Data": RWD_USER_ID</a:t>
+                        <a:t>INFO: Publishing Element in "Test": PRODUCT_ID</a:t>
                       </a:r>
                     </a:p>
                     <a:p>
                       <a:r>
-                        <a:rPr lang="en-US" sz="1000" dirty="0">
+                        <a:rPr lang="en-US" sz="800" dirty="0">
                           <a:latin typeface="Courier New" panose="02070309020205020404" pitchFamily="49" charset="0"/>
                           <a:cs typeface="Courier New" panose="02070309020205020404" pitchFamily="49" charset="0"/>
                         </a:rPr>
@@ -26228,16 +25851,16 @@
                     </a:p>
                     <a:p>
                       <a:r>
-                        <a:rPr lang="en-US" sz="1000" dirty="0">
+                        <a:rPr lang="en-US" sz="800" dirty="0">
                           <a:latin typeface="Courier New" panose="02070309020205020404" pitchFamily="49" charset="0"/>
                           <a:cs typeface="Courier New" panose="02070309020205020404" pitchFamily="49" charset="0"/>
                         </a:rPr>
-                        <a:t>INFO: Publishing Element in "NSEN User Data": USER_NAME</a:t>
+                        <a:t>INFO: Publishing Element in "Test": RWD_TRANS_DATE</a:t>
                       </a:r>
                     </a:p>
                     <a:p>
                       <a:r>
-                        <a:rPr lang="en-US" sz="1000" dirty="0">
+                        <a:rPr lang="en-US" sz="800" dirty="0">
                           <a:latin typeface="Courier New" panose="02070309020205020404" pitchFamily="49" charset="0"/>
                           <a:cs typeface="Courier New" panose="02070309020205020404" pitchFamily="49" charset="0"/>
                         </a:rPr>
@@ -26246,16 +25869,16 @@
                     </a:p>
                     <a:p>
                       <a:r>
-                        <a:rPr lang="en-US" sz="1000" dirty="0">
+                        <a:rPr lang="en-US" sz="800" dirty="0">
                           <a:latin typeface="Courier New" panose="02070309020205020404" pitchFamily="49" charset="0"/>
                           <a:cs typeface="Courier New" panose="02070309020205020404" pitchFamily="49" charset="0"/>
                         </a:rPr>
-                        <a:t>INFO: Publishing Element in "NSEN User Data": RWD_BIRTH_DATE</a:t>
+                        <a:t>INFO: Publishing Element in "Test": CC_NUMBER</a:t>
                       </a:r>
                     </a:p>
                     <a:p>
                       <a:r>
-                        <a:rPr lang="en-US" sz="1000" dirty="0">
+                        <a:rPr lang="en-US" sz="800" dirty="0">
                           <a:latin typeface="Courier New" panose="02070309020205020404" pitchFamily="49" charset="0"/>
                           <a:cs typeface="Courier New" panose="02070309020205020404" pitchFamily="49" charset="0"/>
                         </a:rPr>
@@ -26264,20 +25887,29 @@
                     </a:p>
                     <a:p>
                       <a:r>
-                        <a:rPr lang="en-US" sz="1000" dirty="0">
+                        <a:rPr lang="en-US" sz="800" dirty="0">
                           <a:latin typeface="Courier New" panose="02070309020205020404" pitchFamily="49" charset="0"/>
                           <a:cs typeface="Courier New" panose="02070309020205020404" pitchFamily="49" charset="0"/>
                         </a:rPr>
-                        <a:t>INFO: Publishing Element in "NSEN User Data": RWD_FIRST_NAME</a:t>
+                        <a:t>INFO: Publishing Lineage from "Test" to "Snowflake Marketing User Data"</a:t>
                       </a:r>
                     </a:p>
                     <a:p>
                       <a:r>
-                        <a:rPr lang="en-US" sz="1000" dirty="0">
+                        <a:rPr lang="en-US" sz="800" dirty="0">
                           <a:latin typeface="Courier New" panose="02070309020205020404" pitchFamily="49" charset="0"/>
                           <a:cs typeface="Courier New" panose="02070309020205020404" pitchFamily="49" charset="0"/>
                         </a:rPr>
                         <a:t>INFO: Publish successful</a:t>
+                      </a:r>
+                    </a:p>
+                    <a:p>
+                      <a:r>
+                        <a:rPr lang="en-US" sz="800" dirty="0">
+                          <a:latin typeface="Courier New" panose="02070309020205020404" pitchFamily="49" charset="0"/>
+                          <a:cs typeface="Courier New" panose="02070309020205020404" pitchFamily="49" charset="0"/>
+                        </a:rPr>
+                        <a:t>Press Any Key to exit ...</a:t>
                       </a:r>
                     </a:p>
                   </a:txBody>
@@ -26322,7 +25954,7 @@
 </p:sld>
 </file>
 
-<file path=ppt/slides/slide7.xml><?xml version="1.0" encoding="utf-8"?>
+<file path=ppt/slides/slide6.xml><?xml version="1.0" encoding="utf-8"?>
 <p:sld xmlns:a="http://schemas.openxmlformats.org/drawingml/2006/main" xmlns:r="http://schemas.openxmlformats.org/officeDocument/2006/relationships" xmlns:p="http://schemas.openxmlformats.org/presentationml/2006/main">
   <p:cSld>
     <p:spTree>
@@ -28252,4 +27884,10 @@
     <ds:schemaRef ds:uri="http://schemas.microsoft.com/sharepoint/v3/contenttype/forms"/>
   </ds:schemaRefs>
 </ds:datastoreItem>
+</file>
+
+<file path=docMetadata/LabelInfo.xml><?xml version="1.0" encoding="utf-8"?>
+<clbl:labelList xmlns:clbl="http://schemas.microsoft.com/office/2020/mipLabelMetadata">
+  <clbl:label id="{14c8150c-bc7e-4d77-82d5-2d0905f0cd74}" enabled="1" method="Standard" siteId="{2638f43e-f77d-4fc7-ab92-7b753b7876fd}" contentBits="0" removed="0"/>
+</clbl:labelList>
 </file>
</xml_diff>